<commit_message>
docs: Add missing presentation graphics...
</commit_message>
<xml_diff>
--- a/docs/presentations/Service_Release_Manager_v3.pptx
+++ b/docs/presentations/Service_Release_Manager_v3.pptx
@@ -5,7 +5,7 @@
     <p:sldMasterId id="2147483648" r:id="rId1"/>
   </p:sldMasterIdLst>
   <p:notesMasterIdLst>
-    <p:notesMasterId r:id="rId23"/>
+    <p:notesMasterId r:id="rId24"/>
   </p:notesMasterIdLst>
   <p:sldIdLst>
     <p:sldId id="256" r:id="rId2"/>
@@ -22,13 +22,14 @@
     <p:sldId id="280" r:id="rId13"/>
     <p:sldId id="279" r:id="rId14"/>
     <p:sldId id="283" r:id="rId15"/>
-    <p:sldId id="274" r:id="rId16"/>
-    <p:sldId id="284" r:id="rId17"/>
-    <p:sldId id="282" r:id="rId18"/>
-    <p:sldId id="285" r:id="rId19"/>
-    <p:sldId id="278" r:id="rId20"/>
-    <p:sldId id="269" r:id="rId21"/>
-    <p:sldId id="271" r:id="rId22"/>
+    <p:sldId id="286" r:id="rId16"/>
+    <p:sldId id="274" r:id="rId17"/>
+    <p:sldId id="284" r:id="rId18"/>
+    <p:sldId id="282" r:id="rId19"/>
+    <p:sldId id="285" r:id="rId20"/>
+    <p:sldId id="278" r:id="rId21"/>
+    <p:sldId id="269" r:id="rId22"/>
+    <p:sldId id="271" r:id="rId23"/>
   </p:sldIdLst>
   <p:sldSz cx="12192000" cy="6858000"/>
   <p:notesSz cx="6858000" cy="9144000"/>
@@ -7765,6 +7766,78 @@
           </a:p>
         </p:txBody>
       </p:sp>
+      <p:pic>
+        <p:nvPicPr>
+          <p:cNvPr id="5" name="Grafik 4">
+            <a:extLst>
+              <a:ext uri="{FF2B5EF4-FFF2-40B4-BE49-F238E27FC236}">
+                <a16:creationId xmlns:a16="http://schemas.microsoft.com/office/drawing/2014/main" id="{2D5E908D-30D9-7D01-F56C-BB2F86151EDC}"/>
+              </a:ext>
+            </a:extLst>
+          </p:cNvPr>
+          <p:cNvPicPr>
+            <a:picLocks noChangeAspect="1"/>
+          </p:cNvPicPr>
+          <p:nvPr/>
+        </p:nvPicPr>
+        <p:blipFill>
+          <a:blip r:embed="rId2">
+            <a:extLst>
+              <a:ext uri="{28A0092B-C50C-407E-A947-70E740481C1C}">
+                <a14:useLocalDpi xmlns:a14="http://schemas.microsoft.com/office/drawing/2010/main" val="0"/>
+              </a:ext>
+            </a:extLst>
+          </a:blip>
+          <a:stretch>
+            <a:fillRect/>
+          </a:stretch>
+        </p:blipFill>
+        <p:spPr>
+          <a:xfrm>
+            <a:off x="3968061" y="3429000"/>
+            <a:ext cx="4255878" cy="3125755"/>
+          </a:xfrm>
+          <a:prstGeom prst="rect">
+            <a:avLst/>
+          </a:prstGeom>
+        </p:spPr>
+      </p:pic>
+      <p:sp>
+        <p:nvSpPr>
+          <p:cNvPr id="6" name="Textfeld 5">
+            <a:extLst>
+              <a:ext uri="{FF2B5EF4-FFF2-40B4-BE49-F238E27FC236}">
+                <a16:creationId xmlns:a16="http://schemas.microsoft.com/office/drawing/2014/main" id="{E3E899F9-B9AE-BF33-A45D-B66A92811FE4}"/>
+              </a:ext>
+            </a:extLst>
+          </p:cNvPr>
+          <p:cNvSpPr txBox="1"/>
+          <p:nvPr/>
+        </p:nvSpPr>
+        <p:spPr>
+          <a:xfrm>
+            <a:off x="838200" y="6554755"/>
+            <a:ext cx="10515600" cy="230832"/>
+          </a:xfrm>
+          <a:prstGeom prst="rect">
+            <a:avLst/>
+          </a:prstGeom>
+          <a:noFill/>
+        </p:spPr>
+        <p:txBody>
+          <a:bodyPr wrap="square" rtlCol="0">
+            <a:spAutoFit/>
+          </a:bodyPr>
+          <a:lstStyle/>
+          <a:p>
+            <a:pPr algn="r"/>
+            <a:r>
+              <a:rPr lang="de-DE" sz="900" dirty="0"/>
+              <a:t>https://blog.cleancoder.com/uncle-bob/images/2012-08-13-the-clean-architecture/CleanArchitecture.jpg</a:t>
+            </a:r>
+          </a:p>
+        </p:txBody>
+      </p:sp>
     </p:spTree>
     <p:extLst>
       <p:ext uri="{BB962C8B-B14F-4D97-AF65-F5344CB8AC3E}">
@@ -8138,7 +8211,7 @@
                   <a:srgbClr val="FFFFFF"/>
                 </a:solidFill>
               </a:rPr>
-              <a:t>Schnittstellen: Organisation</a:t>
+              <a:t>Architektur: Backend</a:t>
             </a:r>
           </a:p>
         </p:txBody>
@@ -8148,7 +8221,7 @@
           <p:cNvPr id="5" name="Inhaltsplatzhalter 4">
             <a:extLst>
               <a:ext uri="{FF2B5EF4-FFF2-40B4-BE49-F238E27FC236}">
-                <a16:creationId xmlns:a16="http://schemas.microsoft.com/office/drawing/2014/main" id="{46ACC020-4653-D477-95D5-31A9D506732D}"/>
+                <a16:creationId xmlns:a16="http://schemas.microsoft.com/office/drawing/2014/main" id="{06C78845-8F5C-E2A7-B3F6-8BDB84E714CD}"/>
               </a:ext>
             </a:extLst>
           </p:cNvPr>
@@ -8160,572 +8233,28 @@
           </p:nvPr>
         </p:nvPicPr>
         <p:blipFill>
-          <a:blip r:embed="rId2"/>
+          <a:blip r:embed="rId2">
+            <a:extLst>
+              <a:ext uri="{28A0092B-C50C-407E-A947-70E740481C1C}">
+                <a14:useLocalDpi xmlns:a14="http://schemas.microsoft.com/office/drawing/2010/main" val="0"/>
+              </a:ext>
+            </a:extLst>
+          </a:blip>
           <a:stretch>
             <a:fillRect/>
           </a:stretch>
         </p:blipFill>
         <p:spPr>
           <a:xfrm>
-            <a:off x="838200" y="1991805"/>
-            <a:ext cx="10515600" cy="2056448"/>
+            <a:off x="2120042" y="2055813"/>
+            <a:ext cx="7951916" cy="4659394"/>
           </a:xfrm>
         </p:spPr>
       </p:pic>
-      <p:sp>
-        <p:nvSpPr>
-          <p:cNvPr id="3" name="Textfeld 2">
-            <a:extLst>
-              <a:ext uri="{FF2B5EF4-FFF2-40B4-BE49-F238E27FC236}">
-                <a16:creationId xmlns:a16="http://schemas.microsoft.com/office/drawing/2014/main" id="{68013961-6ADA-E755-1BA2-B5259E5B9D4E}"/>
-              </a:ext>
-            </a:extLst>
-          </p:cNvPr>
-          <p:cNvSpPr txBox="1"/>
-          <p:nvPr/>
-        </p:nvSpPr>
-        <p:spPr>
-          <a:xfrm>
-            <a:off x="838200" y="4048253"/>
-            <a:ext cx="10515600" cy="2616101"/>
-          </a:xfrm>
-          <a:prstGeom prst="rect">
-            <a:avLst/>
-          </a:prstGeom>
-          <a:noFill/>
-        </p:spPr>
-        <p:txBody>
-          <a:bodyPr wrap="square" rtlCol="0">
-            <a:spAutoFit/>
-          </a:bodyPr>
-          <a:lstStyle/>
-          <a:p>
-            <a:r>
-              <a:rPr lang="de-DE" sz="1600" dirty="0"/>
-              <a:t>POST	/</a:t>
-            </a:r>
-            <a:r>
-              <a:rPr lang="de-DE" sz="1600" dirty="0" err="1"/>
-              <a:t>organisations</a:t>
-            </a:r>
-            <a:r>
-              <a:rPr lang="de-DE" sz="1600" dirty="0"/>
-              <a:t>/{</a:t>
-            </a:r>
-            <a:r>
-              <a:rPr lang="de-DE" sz="1600" dirty="0" err="1"/>
-              <a:t>OrganisationId</a:t>
-            </a:r>
-            <a:r>
-              <a:rPr lang="de-DE" sz="1600" dirty="0"/>
-              <a:t>}/</a:t>
-            </a:r>
-            <a:r>
-              <a:rPr lang="de-DE" sz="1600" dirty="0" err="1"/>
-              <a:t>roles</a:t>
-            </a:r>
-            <a:r>
-              <a:rPr lang="de-DE" sz="1600" dirty="0"/>
-              <a:t>		</a:t>
-            </a:r>
-            <a:r>
-              <a:rPr lang="de-DE" sz="1600" dirty="0" err="1"/>
-              <a:t>Creates</a:t>
-            </a:r>
-            <a:r>
-              <a:rPr lang="de-DE" sz="1600" dirty="0"/>
-              <a:t> a </a:t>
-            </a:r>
-            <a:r>
-              <a:rPr lang="de-DE" sz="1600" dirty="0" err="1"/>
-              <a:t>new</a:t>
-            </a:r>
-            <a:r>
-              <a:rPr lang="de-DE" sz="1600" dirty="0"/>
-              <a:t> Organisation </a:t>
-            </a:r>
-            <a:r>
-              <a:rPr lang="de-DE" sz="1600" dirty="0" err="1"/>
-              <a:t>Role</a:t>
-            </a:r>
-            <a:endParaRPr lang="de-DE" sz="1600" dirty="0"/>
-          </a:p>
-          <a:p>
-            <a:r>
-              <a:rPr lang="de-DE" sz="1600" dirty="0"/>
-              <a:t>GET	/</a:t>
-            </a:r>
-            <a:r>
-              <a:rPr lang="de-DE" sz="1600" dirty="0" err="1"/>
-              <a:t>organisations</a:t>
-            </a:r>
-            <a:r>
-              <a:rPr lang="de-DE" sz="1600" dirty="0"/>
-              <a:t>/{</a:t>
-            </a:r>
-            <a:r>
-              <a:rPr lang="de-DE" sz="1600" dirty="0" err="1"/>
-              <a:t>OrganisationId</a:t>
-            </a:r>
-            <a:r>
-              <a:rPr lang="de-DE" sz="1600" dirty="0"/>
-              <a:t>}/</a:t>
-            </a:r>
-            <a:r>
-              <a:rPr lang="de-DE" sz="1600" dirty="0" err="1"/>
-              <a:t>roles</a:t>
-            </a:r>
-            <a:r>
-              <a:rPr lang="de-DE" sz="1600" dirty="0"/>
-              <a:t>		</a:t>
-            </a:r>
-            <a:r>
-              <a:rPr lang="de-DE" sz="1600" dirty="0" err="1"/>
-              <a:t>Gets</a:t>
-            </a:r>
-            <a:r>
-              <a:rPr lang="de-DE" sz="1600" dirty="0"/>
-              <a:t> a </a:t>
-            </a:r>
-            <a:r>
-              <a:rPr lang="de-DE" sz="1600" dirty="0" err="1"/>
-              <a:t>list</a:t>
-            </a:r>
-            <a:r>
-              <a:rPr lang="de-DE" sz="1600" dirty="0"/>
-              <a:t> </a:t>
-            </a:r>
-            <a:r>
-              <a:rPr lang="de-DE" sz="1600" dirty="0" err="1"/>
-              <a:t>of</a:t>
-            </a:r>
-            <a:r>
-              <a:rPr lang="de-DE" sz="1600" dirty="0"/>
-              <a:t> all </a:t>
-            </a:r>
-            <a:r>
-              <a:rPr lang="de-DE" sz="1600" dirty="0" err="1"/>
-              <a:t>organisation</a:t>
-            </a:r>
-            <a:r>
-              <a:rPr lang="de-DE" sz="1600" dirty="0"/>
-              <a:t> </a:t>
-            </a:r>
-            <a:r>
-              <a:rPr lang="de-DE" sz="1600" dirty="0" err="1"/>
-              <a:t>roles</a:t>
-            </a:r>
-            <a:endParaRPr lang="de-DE" sz="1600" dirty="0"/>
-          </a:p>
-          <a:p>
-            <a:r>
-              <a:rPr lang="de-DE" sz="1600" dirty="0"/>
-              <a:t>DELETE	/</a:t>
-            </a:r>
-            <a:r>
-              <a:rPr lang="de-DE" sz="1600" dirty="0" err="1"/>
-              <a:t>organisations</a:t>
-            </a:r>
-            <a:r>
-              <a:rPr lang="de-DE" sz="1600" dirty="0"/>
-              <a:t>/{</a:t>
-            </a:r>
-            <a:r>
-              <a:rPr lang="de-DE" sz="1600" dirty="0" err="1"/>
-              <a:t>OrganisationId</a:t>
-            </a:r>
-            <a:r>
-              <a:rPr lang="de-DE" sz="1600" dirty="0"/>
-              <a:t>}/</a:t>
-            </a:r>
-            <a:r>
-              <a:rPr lang="de-DE" sz="1600" dirty="0" err="1"/>
-              <a:t>roles</a:t>
-            </a:r>
-            <a:r>
-              <a:rPr lang="de-DE" sz="1600" dirty="0"/>
-              <a:t>/{</a:t>
-            </a:r>
-            <a:r>
-              <a:rPr lang="de-DE" sz="1600" dirty="0" err="1"/>
-              <a:t>name</a:t>
-            </a:r>
-            <a:r>
-              <a:rPr lang="de-DE" sz="1600" dirty="0"/>
-              <a:t>}	</a:t>
-            </a:r>
-            <a:r>
-              <a:rPr lang="de-DE" sz="1600" dirty="0" err="1"/>
-              <a:t>Deletes</a:t>
-            </a:r>
-            <a:r>
-              <a:rPr lang="de-DE" sz="1600" dirty="0"/>
-              <a:t> an </a:t>
-            </a:r>
-            <a:r>
-              <a:rPr lang="de-DE" sz="1600" dirty="0" err="1"/>
-              <a:t>organisation</a:t>
-            </a:r>
-            <a:r>
-              <a:rPr lang="de-DE" sz="1600" dirty="0"/>
-              <a:t> </a:t>
-            </a:r>
-            <a:r>
-              <a:rPr lang="de-DE" sz="1600" dirty="0" err="1"/>
-              <a:t>role</a:t>
-            </a:r>
-            <a:endParaRPr lang="de-DE" sz="1600" dirty="0"/>
-          </a:p>
-          <a:p>
-            <a:r>
-              <a:rPr lang="de-DE" sz="1600" dirty="0"/>
-              <a:t>GET	/</a:t>
-            </a:r>
-            <a:r>
-              <a:rPr lang="de-DE" sz="1600" dirty="0" err="1"/>
-              <a:t>organisations</a:t>
-            </a:r>
-            <a:r>
-              <a:rPr lang="de-DE" sz="1600" dirty="0"/>
-              <a:t>/{</a:t>
-            </a:r>
-            <a:r>
-              <a:rPr lang="de-DE" sz="1600" dirty="0" err="1"/>
-              <a:t>OrganisationId</a:t>
-            </a:r>
-            <a:r>
-              <a:rPr lang="de-DE" sz="1600" dirty="0"/>
-              <a:t>}/</a:t>
-            </a:r>
-            <a:r>
-              <a:rPr lang="de-DE" sz="1600" dirty="0" err="1"/>
-              <a:t>roles</a:t>
-            </a:r>
-            <a:r>
-              <a:rPr lang="de-DE" sz="1600" dirty="0"/>
-              <a:t>/{</a:t>
-            </a:r>
-            <a:r>
-              <a:rPr lang="de-DE" sz="1600" dirty="0" err="1"/>
-              <a:t>name</a:t>
-            </a:r>
-            <a:r>
-              <a:rPr lang="de-DE" sz="1600" dirty="0"/>
-              <a:t>}	</a:t>
-            </a:r>
-            <a:r>
-              <a:rPr lang="de-DE" sz="1600" dirty="0" err="1"/>
-              <a:t>Gets</a:t>
-            </a:r>
-            <a:r>
-              <a:rPr lang="de-DE" sz="1600" dirty="0"/>
-              <a:t> a </a:t>
-            </a:r>
-            <a:r>
-              <a:rPr lang="de-DE" sz="1600" dirty="0" err="1"/>
-              <a:t>single</a:t>
-            </a:r>
-            <a:r>
-              <a:rPr lang="de-DE" sz="1600" dirty="0"/>
-              <a:t> </a:t>
-            </a:r>
-            <a:r>
-              <a:rPr lang="de-DE" sz="1600" dirty="0" err="1"/>
-              <a:t>organisation</a:t>
-            </a:r>
-            <a:r>
-              <a:rPr lang="de-DE" sz="1600" dirty="0"/>
-              <a:t> </a:t>
-            </a:r>
-            <a:r>
-              <a:rPr lang="de-DE" sz="1600" dirty="0" err="1"/>
-              <a:t>role</a:t>
-            </a:r>
-            <a:r>
-              <a:rPr lang="de-DE" sz="1600" dirty="0"/>
-              <a:t> </a:t>
-            </a:r>
-            <a:r>
-              <a:rPr lang="de-DE" sz="1600" dirty="0" err="1"/>
-              <a:t>by</a:t>
-            </a:r>
-            <a:r>
-              <a:rPr lang="de-DE" sz="1600" dirty="0"/>
-              <a:t> </a:t>
-            </a:r>
-            <a:r>
-              <a:rPr lang="de-DE" sz="1600" dirty="0" err="1"/>
-              <a:t>name</a:t>
-            </a:r>
-            <a:endParaRPr lang="de-DE" sz="1600" dirty="0"/>
-          </a:p>
-          <a:p>
-            <a:endParaRPr lang="de-DE" sz="1600" dirty="0"/>
-          </a:p>
-          <a:p>
-            <a:r>
-              <a:rPr lang="de-DE" sz="1600" dirty="0"/>
-              <a:t>POST	/</a:t>
-            </a:r>
-            <a:r>
-              <a:rPr lang="de-DE" sz="1600" dirty="0" err="1"/>
-              <a:t>organisations</a:t>
-            </a:r>
-            <a:r>
-              <a:rPr lang="de-DE" sz="1600" dirty="0"/>
-              <a:t>/{</a:t>
-            </a:r>
-            <a:r>
-              <a:rPr lang="de-DE" sz="1600" dirty="0" err="1"/>
-              <a:t>OrganisationId</a:t>
-            </a:r>
-            <a:r>
-              <a:rPr lang="de-DE" sz="1600" dirty="0"/>
-              <a:t>}/</a:t>
-            </a:r>
-            <a:r>
-              <a:rPr lang="de-DE" sz="1600" dirty="0" err="1"/>
-              <a:t>users</a:t>
-            </a:r>
-            <a:r>
-              <a:rPr lang="de-DE" sz="1600" dirty="0"/>
-              <a:t>		</a:t>
-            </a:r>
-            <a:r>
-              <a:rPr lang="de-DE" sz="1600" dirty="0" err="1"/>
-              <a:t>Creates</a:t>
-            </a:r>
-            <a:r>
-              <a:rPr lang="de-DE" sz="1600" dirty="0"/>
-              <a:t> a </a:t>
-            </a:r>
-            <a:r>
-              <a:rPr lang="de-DE" sz="1600" dirty="0" err="1"/>
-              <a:t>new</a:t>
-            </a:r>
-            <a:r>
-              <a:rPr lang="de-DE" sz="1600" dirty="0"/>
-              <a:t> Organisation User</a:t>
-            </a:r>
-          </a:p>
-          <a:p>
-            <a:r>
-              <a:rPr lang="de-DE" sz="1600" dirty="0"/>
-              <a:t>GET	/</a:t>
-            </a:r>
-            <a:r>
-              <a:rPr lang="de-DE" sz="1600" dirty="0" err="1"/>
-              <a:t>organisations</a:t>
-            </a:r>
-            <a:r>
-              <a:rPr lang="de-DE" sz="1600" dirty="0"/>
-              <a:t>/{</a:t>
-            </a:r>
-            <a:r>
-              <a:rPr lang="de-DE" sz="1600" dirty="0" err="1"/>
-              <a:t>OrganisationId</a:t>
-            </a:r>
-            <a:r>
-              <a:rPr lang="de-DE" sz="1600" dirty="0"/>
-              <a:t>}/</a:t>
-            </a:r>
-            <a:r>
-              <a:rPr lang="de-DE" sz="1600" dirty="0" err="1"/>
-              <a:t>users</a:t>
-            </a:r>
-            <a:r>
-              <a:rPr lang="de-DE" sz="1600" dirty="0"/>
-              <a:t>		</a:t>
-            </a:r>
-            <a:r>
-              <a:rPr lang="de-DE" sz="1600" dirty="0" err="1"/>
-              <a:t>Gets</a:t>
-            </a:r>
-            <a:r>
-              <a:rPr lang="de-DE" sz="1600" dirty="0"/>
-              <a:t> a </a:t>
-            </a:r>
-            <a:r>
-              <a:rPr lang="de-DE" sz="1600" dirty="0" err="1"/>
-              <a:t>list</a:t>
-            </a:r>
-            <a:r>
-              <a:rPr lang="de-DE" sz="1600" dirty="0"/>
-              <a:t> </a:t>
-            </a:r>
-            <a:r>
-              <a:rPr lang="de-DE" sz="1600" dirty="0" err="1"/>
-              <a:t>of</a:t>
-            </a:r>
-            <a:r>
-              <a:rPr lang="de-DE" sz="1600" dirty="0"/>
-              <a:t> all </a:t>
-            </a:r>
-            <a:r>
-              <a:rPr lang="de-DE" sz="1600" dirty="0" err="1"/>
-              <a:t>organisation</a:t>
-            </a:r>
-            <a:r>
-              <a:rPr lang="de-DE" sz="1600" dirty="0"/>
-              <a:t> </a:t>
-            </a:r>
-            <a:r>
-              <a:rPr lang="de-DE" sz="1600" dirty="0" err="1"/>
-              <a:t>users</a:t>
-            </a:r>
-            <a:endParaRPr lang="de-DE" sz="1600" dirty="0"/>
-          </a:p>
-          <a:p>
-            <a:r>
-              <a:rPr lang="de-DE" sz="1600" dirty="0"/>
-              <a:t>DELETE	/</a:t>
-            </a:r>
-            <a:r>
-              <a:rPr lang="de-DE" sz="1600" dirty="0" err="1"/>
-              <a:t>organisations</a:t>
-            </a:r>
-            <a:r>
-              <a:rPr lang="de-DE" sz="1600" dirty="0"/>
-              <a:t>/{</a:t>
-            </a:r>
-            <a:r>
-              <a:rPr lang="de-DE" sz="1600" dirty="0" err="1"/>
-              <a:t>OrganisationId</a:t>
-            </a:r>
-            <a:r>
-              <a:rPr lang="de-DE" sz="1600" dirty="0"/>
-              <a:t>}/</a:t>
-            </a:r>
-            <a:r>
-              <a:rPr lang="de-DE" sz="1600" dirty="0" err="1"/>
-              <a:t>users</a:t>
-            </a:r>
-            <a:r>
-              <a:rPr lang="de-DE" sz="1600" dirty="0"/>
-              <a:t>/{</a:t>
-            </a:r>
-            <a:r>
-              <a:rPr lang="de-DE" sz="1600" dirty="0" err="1"/>
-              <a:t>id</a:t>
-            </a:r>
-            <a:r>
-              <a:rPr lang="de-DE" sz="1600" dirty="0"/>
-              <a:t>}		</a:t>
-            </a:r>
-            <a:r>
-              <a:rPr lang="de-DE" sz="1600" dirty="0" err="1"/>
-              <a:t>Deletes</a:t>
-            </a:r>
-            <a:r>
-              <a:rPr lang="de-DE" sz="1600" dirty="0"/>
-              <a:t> an </a:t>
-            </a:r>
-            <a:r>
-              <a:rPr lang="de-DE" sz="1600" dirty="0" err="1"/>
-              <a:t>organisation</a:t>
-            </a:r>
-            <a:r>
-              <a:rPr lang="de-DE" sz="1600" dirty="0"/>
-              <a:t> </a:t>
-            </a:r>
-            <a:r>
-              <a:rPr lang="de-DE" sz="1600" dirty="0" err="1"/>
-              <a:t>user</a:t>
-            </a:r>
-            <a:endParaRPr lang="de-DE" sz="1600" dirty="0"/>
-          </a:p>
-          <a:p>
-            <a:r>
-              <a:rPr lang="de-DE" sz="1600" dirty="0"/>
-              <a:t>GET	/</a:t>
-            </a:r>
-            <a:r>
-              <a:rPr lang="de-DE" sz="1600" dirty="0" err="1"/>
-              <a:t>organisations</a:t>
-            </a:r>
-            <a:r>
-              <a:rPr lang="de-DE" sz="1600" dirty="0"/>
-              <a:t>/{</a:t>
-            </a:r>
-            <a:r>
-              <a:rPr lang="de-DE" sz="1600" dirty="0" err="1"/>
-              <a:t>OrganisationId</a:t>
-            </a:r>
-            <a:r>
-              <a:rPr lang="de-DE" sz="1600" dirty="0"/>
-              <a:t>}/</a:t>
-            </a:r>
-            <a:r>
-              <a:rPr lang="de-DE" sz="1600" dirty="0" err="1"/>
-              <a:t>users</a:t>
-            </a:r>
-            <a:r>
-              <a:rPr lang="de-DE" sz="1600" dirty="0"/>
-              <a:t>/{</a:t>
-            </a:r>
-            <a:r>
-              <a:rPr lang="de-DE" sz="1600" dirty="0" err="1"/>
-              <a:t>id</a:t>
-            </a:r>
-            <a:r>
-              <a:rPr lang="de-DE" sz="1600" dirty="0"/>
-              <a:t>}		</a:t>
-            </a:r>
-            <a:r>
-              <a:rPr lang="de-DE" sz="1600" dirty="0" err="1"/>
-              <a:t>Gets</a:t>
-            </a:r>
-            <a:r>
-              <a:rPr lang="de-DE" sz="1600" dirty="0"/>
-              <a:t> a </a:t>
-            </a:r>
-            <a:r>
-              <a:rPr lang="de-DE" sz="1600" dirty="0" err="1"/>
-              <a:t>single</a:t>
-            </a:r>
-            <a:r>
-              <a:rPr lang="de-DE" sz="1600" dirty="0"/>
-              <a:t> </a:t>
-            </a:r>
-            <a:r>
-              <a:rPr lang="de-DE" sz="1600" dirty="0" err="1"/>
-              <a:t>organisation</a:t>
-            </a:r>
-            <a:r>
-              <a:rPr lang="de-DE" sz="1600" dirty="0"/>
-              <a:t> </a:t>
-            </a:r>
-            <a:r>
-              <a:rPr lang="de-DE" sz="1600" dirty="0" err="1"/>
-              <a:t>user</a:t>
-            </a:r>
-            <a:r>
-              <a:rPr lang="de-DE" sz="1600" dirty="0"/>
-              <a:t> </a:t>
-            </a:r>
-            <a:r>
-              <a:rPr lang="de-DE" sz="1600" dirty="0" err="1"/>
-              <a:t>by</a:t>
-            </a:r>
-            <a:r>
-              <a:rPr lang="de-DE" sz="1600" dirty="0"/>
-              <a:t> </a:t>
-            </a:r>
-            <a:r>
-              <a:rPr lang="de-DE" sz="1600" dirty="0" err="1"/>
-              <a:t>name</a:t>
-            </a:r>
-            <a:endParaRPr lang="de-DE" sz="1600" dirty="0"/>
-          </a:p>
-          <a:p>
-            <a:endParaRPr lang="de-DE" sz="1600" dirty="0"/>
-          </a:p>
-        </p:txBody>
-      </p:sp>
     </p:spTree>
     <p:extLst>
       <p:ext uri="{BB962C8B-B14F-4D97-AF65-F5344CB8AC3E}">
-        <p14:creationId xmlns:p14="http://schemas.microsoft.com/office/powerpoint/2010/main" val="4073281005"/>
+        <p14:creationId xmlns:p14="http://schemas.microsoft.com/office/powerpoint/2010/main" val="717806887"/>
       </p:ext>
     </p:extLst>
   </p:cSld>
@@ -8857,53 +8386,95 @@
                   <a:srgbClr val="FFFFFF"/>
                 </a:solidFill>
               </a:rPr>
-              <a:t>Schnittstellen: Services</a:t>
-            </a:r>
-          </a:p>
-        </p:txBody>
-      </p:sp>
-      <p:sp>
-        <p:nvSpPr>
-          <p:cNvPr id="3" name="Inhaltsplatzhalter 2">
-            <a:extLst>
-              <a:ext uri="{FF2B5EF4-FFF2-40B4-BE49-F238E27FC236}">
-                <a16:creationId xmlns:a16="http://schemas.microsoft.com/office/drawing/2014/main" id="{F885A8B1-6ACB-212B-46D3-63CC7536063C}"/>
-              </a:ext>
-            </a:extLst>
-          </p:cNvPr>
-          <p:cNvSpPr>
-            <a:spLocks noGrp="1"/>
-          </p:cNvSpPr>
+              <a:t>Schnittstellen: Organisation</a:t>
+            </a:r>
+          </a:p>
+        </p:txBody>
+      </p:sp>
+      <p:pic>
+        <p:nvPicPr>
+          <p:cNvPr id="5" name="Inhaltsplatzhalter 4">
+            <a:extLst>
+              <a:ext uri="{FF2B5EF4-FFF2-40B4-BE49-F238E27FC236}">
+                <a16:creationId xmlns:a16="http://schemas.microsoft.com/office/drawing/2014/main" id="{46ACC020-4653-D477-95D5-31A9D506732D}"/>
+              </a:ext>
+            </a:extLst>
+          </p:cNvPr>
+          <p:cNvPicPr>
+            <a:picLocks noGrp="1" noChangeAspect="1"/>
+          </p:cNvPicPr>
           <p:nvPr>
             <p:ph idx="1"/>
           </p:nvPr>
-        </p:nvSpPr>
+        </p:nvPicPr>
+        <p:blipFill>
+          <a:blip r:embed="rId2"/>
+          <a:stretch>
+            <a:fillRect/>
+          </a:stretch>
+        </p:blipFill>
         <p:spPr>
           <a:xfrm>
-            <a:off x="838200" y="2438400"/>
-            <a:ext cx="10515600" cy="3738562"/>
+            <a:off x="838200" y="1991805"/>
+            <a:ext cx="10515600" cy="2056448"/>
           </a:xfrm>
         </p:spPr>
-        <p:txBody>
-          <a:bodyPr>
-            <a:normAutofit/>
+      </p:pic>
+      <p:sp>
+        <p:nvSpPr>
+          <p:cNvPr id="3" name="Textfeld 2">
+            <a:extLst>
+              <a:ext uri="{FF2B5EF4-FFF2-40B4-BE49-F238E27FC236}">
+                <a16:creationId xmlns:a16="http://schemas.microsoft.com/office/drawing/2014/main" id="{68013961-6ADA-E755-1BA2-B5259E5B9D4E}"/>
+              </a:ext>
+            </a:extLst>
+          </p:cNvPr>
+          <p:cNvSpPr txBox="1"/>
+          <p:nvPr/>
+        </p:nvSpPr>
+        <p:spPr>
+          <a:xfrm>
+            <a:off x="838200" y="4048253"/>
+            <a:ext cx="10515600" cy="2616101"/>
+          </a:xfrm>
+          <a:prstGeom prst="rect">
+            <a:avLst/>
+          </a:prstGeom>
+          <a:noFill/>
+        </p:spPr>
+        <p:txBody>
+          <a:bodyPr wrap="square" rtlCol="0">
+            <a:spAutoFit/>
           </a:bodyPr>
           <a:lstStyle/>
           <a:p>
-            <a:pPr marL="0" indent="0">
-              <a:buNone/>
-            </a:pPr>
-            <a:r>
-              <a:rPr lang="de-DE" sz="1600" dirty="0"/>
-              <a:t>POST		/</a:t>
+            <a:r>
+              <a:rPr lang="de-DE" sz="1600" dirty="0"/>
+              <a:t>POST	/</a:t>
             </a:r>
             <a:r>
               <a:rPr lang="de-DE" sz="1600" dirty="0" err="1"/>
-              <a:t>services</a:t>
-            </a:r>
-            <a:r>
-              <a:rPr lang="de-DE" sz="1600" dirty="0"/>
-              <a:t>					</a:t>
+              <a:t>organisations</a:t>
+            </a:r>
+            <a:r>
+              <a:rPr lang="de-DE" sz="1600" dirty="0"/>
+              <a:t>/{</a:t>
+            </a:r>
+            <a:r>
+              <a:rPr lang="de-DE" sz="1600" dirty="0" err="1"/>
+              <a:t>OrganisationId</a:t>
+            </a:r>
+            <a:r>
+              <a:rPr lang="de-DE" sz="1600" dirty="0"/>
+              <a:t>}/</a:t>
+            </a:r>
+            <a:r>
+              <a:rPr lang="de-DE" sz="1600" dirty="0" err="1"/>
+              <a:t>roles</a:t>
+            </a:r>
+            <a:r>
+              <a:rPr lang="de-DE" sz="1600" dirty="0"/>
+              <a:t>		</a:t>
             </a:r>
             <a:r>
               <a:rPr lang="de-DE" sz="1600" dirty="0" err="1"/>
@@ -8919,24 +8490,42 @@
             </a:r>
             <a:r>
               <a:rPr lang="de-DE" sz="1600" dirty="0"/>
-              <a:t> Service / App</a:t>
-            </a:r>
-          </a:p>
-          <a:p>
-            <a:pPr marL="0" indent="0">
-              <a:buNone/>
-            </a:pPr>
-            <a:r>
-              <a:rPr lang="de-DE" sz="1600" dirty="0"/>
-              <a:t>GET		/</a:t>
+              <a:t> Organisation </a:t>
             </a:r>
             <a:r>
               <a:rPr lang="de-DE" sz="1600" dirty="0" err="1"/>
-              <a:t>services</a:t>
-            </a:r>
-            <a:r>
-              <a:rPr lang="de-DE" sz="1600" dirty="0"/>
-              <a:t>					</a:t>
+              <a:t>Role</a:t>
+            </a:r>
+            <a:endParaRPr lang="de-DE" sz="1600" dirty="0"/>
+          </a:p>
+          <a:p>
+            <a:r>
+              <a:rPr lang="de-DE" sz="1600" dirty="0"/>
+              <a:t>GET	/</a:t>
+            </a:r>
+            <a:r>
+              <a:rPr lang="de-DE" sz="1600" dirty="0" err="1"/>
+              <a:t>organisations</a:t>
+            </a:r>
+            <a:r>
+              <a:rPr lang="de-DE" sz="1600" dirty="0"/>
+              <a:t>/{</a:t>
+            </a:r>
+            <a:r>
+              <a:rPr lang="de-DE" sz="1600" dirty="0" err="1"/>
+              <a:t>OrganisationId</a:t>
+            </a:r>
+            <a:r>
+              <a:rPr lang="de-DE" sz="1600" dirty="0"/>
+              <a:t>}/</a:t>
+            </a:r>
+            <a:r>
+              <a:rPr lang="de-DE" sz="1600" dirty="0" err="1"/>
+              <a:t>roles</a:t>
+            </a:r>
+            <a:r>
+              <a:rPr lang="de-DE" sz="1600" dirty="0"/>
+              <a:t>		</a:t>
             </a:r>
             <a:r>
               <a:rPr lang="de-DE" sz="1600" dirty="0" err="1"/>
@@ -8960,20 +8549,30 @@
             </a:r>
             <a:r>
               <a:rPr lang="de-DE" sz="1600" dirty="0"/>
-              <a:t> all Services / App</a:t>
-            </a:r>
-          </a:p>
-          <a:p>
-            <a:pPr marL="0" indent="0">
-              <a:buNone/>
-            </a:pPr>
-            <a:r>
-              <a:rPr lang="de-DE" sz="1600" dirty="0"/>
-              <a:t>DELETE		/</a:t>
+              <a:t> all </a:t>
             </a:r>
             <a:r>
               <a:rPr lang="de-DE" sz="1600" dirty="0" err="1"/>
-              <a:t>services</a:t>
+              <a:t>organisation</a:t>
+            </a:r>
+            <a:r>
+              <a:rPr lang="de-DE" sz="1600" dirty="0"/>
+              <a:t> </a:t>
+            </a:r>
+            <a:r>
+              <a:rPr lang="de-DE" sz="1600" dirty="0" err="1"/>
+              <a:t>roles</a:t>
+            </a:r>
+            <a:endParaRPr lang="de-DE" sz="1600" dirty="0"/>
+          </a:p>
+          <a:p>
+            <a:r>
+              <a:rPr lang="de-DE" sz="1600" dirty="0"/>
+              <a:t>DELETE	/</a:t>
+            </a:r>
+            <a:r>
+              <a:rPr lang="de-DE" sz="1600" dirty="0" err="1"/>
+              <a:t>organisations</a:t>
             </a:r>
             <a:r>
               <a:rPr lang="de-DE" sz="1600" dirty="0"/>
@@ -8981,11 +8580,27 @@
             </a:r>
             <a:r>
               <a:rPr lang="de-DE" sz="1600" dirty="0" err="1"/>
-              <a:t>ServiceId</a:t>
-            </a:r>
-            <a:r>
-              <a:rPr lang="de-DE" sz="1600" dirty="0"/>
-              <a:t>}				</a:t>
+              <a:t>OrganisationId</a:t>
+            </a:r>
+            <a:r>
+              <a:rPr lang="de-DE" sz="1600" dirty="0"/>
+              <a:t>}/</a:t>
+            </a:r>
+            <a:r>
+              <a:rPr lang="de-DE" sz="1600" dirty="0" err="1"/>
+              <a:t>roles</a:t>
+            </a:r>
+            <a:r>
+              <a:rPr lang="de-DE" sz="1600" dirty="0"/>
+              <a:t>/{</a:t>
+            </a:r>
+            <a:r>
+              <a:rPr lang="de-DE" sz="1600" dirty="0" err="1"/>
+              <a:t>name</a:t>
+            </a:r>
+            <a:r>
+              <a:rPr lang="de-DE" sz="1600" dirty="0"/>
+              <a:t>}	</a:t>
             </a:r>
             <a:r>
               <a:rPr lang="de-DE" sz="1600" dirty="0" err="1"/>
@@ -8993,20 +8608,30 @@
             </a:r>
             <a:r>
               <a:rPr lang="de-DE" sz="1600" dirty="0"/>
-              <a:t> a Service / App</a:t>
-            </a:r>
-          </a:p>
-          <a:p>
-            <a:pPr marL="0" indent="0">
-              <a:buNone/>
-            </a:pPr>
-            <a:r>
-              <a:rPr lang="de-DE" sz="1600" dirty="0"/>
-              <a:t>GET		/</a:t>
+              <a:t> an </a:t>
             </a:r>
             <a:r>
               <a:rPr lang="de-DE" sz="1600" dirty="0" err="1"/>
-              <a:t>services</a:t>
+              <a:t>organisation</a:t>
+            </a:r>
+            <a:r>
+              <a:rPr lang="de-DE" sz="1600" dirty="0"/>
+              <a:t> </a:t>
+            </a:r>
+            <a:r>
+              <a:rPr lang="de-DE" sz="1600" dirty="0" err="1"/>
+              <a:t>role</a:t>
+            </a:r>
+            <a:endParaRPr lang="de-DE" sz="1600" dirty="0"/>
+          </a:p>
+          <a:p>
+            <a:r>
+              <a:rPr lang="de-DE" sz="1600" dirty="0"/>
+              <a:t>GET	/</a:t>
+            </a:r>
+            <a:r>
+              <a:rPr lang="de-DE" sz="1600" dirty="0" err="1"/>
+              <a:t>organisations</a:t>
             </a:r>
             <a:r>
               <a:rPr lang="de-DE" sz="1600" dirty="0"/>
@@ -9014,11 +8639,27 @@
             </a:r>
             <a:r>
               <a:rPr lang="de-DE" sz="1600" dirty="0" err="1"/>
-              <a:t>ServiceId</a:t>
-            </a:r>
-            <a:r>
-              <a:rPr lang="de-DE" sz="1600" dirty="0"/>
-              <a:t>}				</a:t>
+              <a:t>OrganisationId</a:t>
+            </a:r>
+            <a:r>
+              <a:rPr lang="de-DE" sz="1600" dirty="0"/>
+              <a:t>}/</a:t>
+            </a:r>
+            <a:r>
+              <a:rPr lang="de-DE" sz="1600" dirty="0" err="1"/>
+              <a:t>roles</a:t>
+            </a:r>
+            <a:r>
+              <a:rPr lang="de-DE" sz="1600" dirty="0"/>
+              <a:t>/{</a:t>
+            </a:r>
+            <a:r>
+              <a:rPr lang="de-DE" sz="1600" dirty="0" err="1"/>
+              <a:t>name</a:t>
+            </a:r>
+            <a:r>
+              <a:rPr lang="de-DE" sz="1600" dirty="0"/>
+              <a:t>}	</a:t>
             </a:r>
             <a:r>
               <a:rPr lang="de-DE" sz="1600" dirty="0" err="1"/>
@@ -9034,15 +8675,305 @@
             </a:r>
             <a:r>
               <a:rPr lang="de-DE" sz="1600" dirty="0"/>
-              <a:t> Service / App</a:t>
-            </a:r>
+              <a:t> </a:t>
+            </a:r>
+            <a:r>
+              <a:rPr lang="de-DE" sz="1600" dirty="0" err="1"/>
+              <a:t>organisation</a:t>
+            </a:r>
+            <a:r>
+              <a:rPr lang="de-DE" sz="1600" dirty="0"/>
+              <a:t> </a:t>
+            </a:r>
+            <a:r>
+              <a:rPr lang="de-DE" sz="1600" dirty="0" err="1"/>
+              <a:t>role</a:t>
+            </a:r>
+            <a:r>
+              <a:rPr lang="de-DE" sz="1600" dirty="0"/>
+              <a:t> </a:t>
+            </a:r>
+            <a:r>
+              <a:rPr lang="de-DE" sz="1600" dirty="0" err="1"/>
+              <a:t>by</a:t>
+            </a:r>
+            <a:r>
+              <a:rPr lang="de-DE" sz="1600" dirty="0"/>
+              <a:t> </a:t>
+            </a:r>
+            <a:r>
+              <a:rPr lang="de-DE" sz="1600" dirty="0" err="1"/>
+              <a:t>name</a:t>
+            </a:r>
+            <a:endParaRPr lang="de-DE" sz="1600" dirty="0"/>
+          </a:p>
+          <a:p>
+            <a:endParaRPr lang="de-DE" sz="1600" dirty="0"/>
+          </a:p>
+          <a:p>
+            <a:r>
+              <a:rPr lang="de-DE" sz="1600" dirty="0"/>
+              <a:t>POST	/</a:t>
+            </a:r>
+            <a:r>
+              <a:rPr lang="de-DE" sz="1600" dirty="0" err="1"/>
+              <a:t>organisations</a:t>
+            </a:r>
+            <a:r>
+              <a:rPr lang="de-DE" sz="1600" dirty="0"/>
+              <a:t>/{</a:t>
+            </a:r>
+            <a:r>
+              <a:rPr lang="de-DE" sz="1600" dirty="0" err="1"/>
+              <a:t>OrganisationId</a:t>
+            </a:r>
+            <a:r>
+              <a:rPr lang="de-DE" sz="1600" dirty="0"/>
+              <a:t>}/</a:t>
+            </a:r>
+            <a:r>
+              <a:rPr lang="de-DE" sz="1600" dirty="0" err="1"/>
+              <a:t>users</a:t>
+            </a:r>
+            <a:r>
+              <a:rPr lang="de-DE" sz="1600" dirty="0"/>
+              <a:t>		</a:t>
+            </a:r>
+            <a:r>
+              <a:rPr lang="de-DE" sz="1600" dirty="0" err="1"/>
+              <a:t>Creates</a:t>
+            </a:r>
+            <a:r>
+              <a:rPr lang="de-DE" sz="1600" dirty="0"/>
+              <a:t> a </a:t>
+            </a:r>
+            <a:r>
+              <a:rPr lang="de-DE" sz="1600" dirty="0" err="1"/>
+              <a:t>new</a:t>
+            </a:r>
+            <a:r>
+              <a:rPr lang="de-DE" sz="1600" dirty="0"/>
+              <a:t> Organisation User</a:t>
+            </a:r>
+          </a:p>
+          <a:p>
+            <a:r>
+              <a:rPr lang="de-DE" sz="1600" dirty="0"/>
+              <a:t>GET	/</a:t>
+            </a:r>
+            <a:r>
+              <a:rPr lang="de-DE" sz="1600" dirty="0" err="1"/>
+              <a:t>organisations</a:t>
+            </a:r>
+            <a:r>
+              <a:rPr lang="de-DE" sz="1600" dirty="0"/>
+              <a:t>/{</a:t>
+            </a:r>
+            <a:r>
+              <a:rPr lang="de-DE" sz="1600" dirty="0" err="1"/>
+              <a:t>OrganisationId</a:t>
+            </a:r>
+            <a:r>
+              <a:rPr lang="de-DE" sz="1600" dirty="0"/>
+              <a:t>}/</a:t>
+            </a:r>
+            <a:r>
+              <a:rPr lang="de-DE" sz="1600" dirty="0" err="1"/>
+              <a:t>users</a:t>
+            </a:r>
+            <a:r>
+              <a:rPr lang="de-DE" sz="1600" dirty="0"/>
+              <a:t>		</a:t>
+            </a:r>
+            <a:r>
+              <a:rPr lang="de-DE" sz="1600" dirty="0" err="1"/>
+              <a:t>Gets</a:t>
+            </a:r>
+            <a:r>
+              <a:rPr lang="de-DE" sz="1600" dirty="0"/>
+              <a:t> a </a:t>
+            </a:r>
+            <a:r>
+              <a:rPr lang="de-DE" sz="1600" dirty="0" err="1"/>
+              <a:t>list</a:t>
+            </a:r>
+            <a:r>
+              <a:rPr lang="de-DE" sz="1600" dirty="0"/>
+              <a:t> </a:t>
+            </a:r>
+            <a:r>
+              <a:rPr lang="de-DE" sz="1600" dirty="0" err="1"/>
+              <a:t>of</a:t>
+            </a:r>
+            <a:r>
+              <a:rPr lang="de-DE" sz="1600" dirty="0"/>
+              <a:t> all </a:t>
+            </a:r>
+            <a:r>
+              <a:rPr lang="de-DE" sz="1600" dirty="0" err="1"/>
+              <a:t>organisation</a:t>
+            </a:r>
+            <a:r>
+              <a:rPr lang="de-DE" sz="1600" dirty="0"/>
+              <a:t> </a:t>
+            </a:r>
+            <a:r>
+              <a:rPr lang="de-DE" sz="1600" dirty="0" err="1"/>
+              <a:t>users</a:t>
+            </a:r>
+            <a:endParaRPr lang="de-DE" sz="1600" dirty="0"/>
+          </a:p>
+          <a:p>
+            <a:r>
+              <a:rPr lang="de-DE" sz="1600" dirty="0"/>
+              <a:t>DELETE	/</a:t>
+            </a:r>
+            <a:r>
+              <a:rPr lang="de-DE" sz="1600" dirty="0" err="1"/>
+              <a:t>organisations</a:t>
+            </a:r>
+            <a:r>
+              <a:rPr lang="de-DE" sz="1600" dirty="0"/>
+              <a:t>/{</a:t>
+            </a:r>
+            <a:r>
+              <a:rPr lang="de-DE" sz="1600" dirty="0" err="1"/>
+              <a:t>OrganisationId</a:t>
+            </a:r>
+            <a:r>
+              <a:rPr lang="de-DE" sz="1600" dirty="0"/>
+              <a:t>}/</a:t>
+            </a:r>
+            <a:r>
+              <a:rPr lang="de-DE" sz="1600" dirty="0" err="1"/>
+              <a:t>users</a:t>
+            </a:r>
+            <a:r>
+              <a:rPr lang="de-DE" sz="1600" dirty="0"/>
+              <a:t>/{</a:t>
+            </a:r>
+            <a:r>
+              <a:rPr lang="de-DE" sz="1600" dirty="0" err="1"/>
+              <a:t>id</a:t>
+            </a:r>
+            <a:r>
+              <a:rPr lang="de-DE" sz="1600" dirty="0"/>
+              <a:t>}		</a:t>
+            </a:r>
+            <a:r>
+              <a:rPr lang="de-DE" sz="1600" dirty="0" err="1"/>
+              <a:t>Deletes</a:t>
+            </a:r>
+            <a:r>
+              <a:rPr lang="de-DE" sz="1600" dirty="0"/>
+              <a:t> an </a:t>
+            </a:r>
+            <a:r>
+              <a:rPr lang="de-DE" sz="1600" dirty="0" err="1"/>
+              <a:t>organisation</a:t>
+            </a:r>
+            <a:r>
+              <a:rPr lang="de-DE" sz="1600" dirty="0"/>
+              <a:t> </a:t>
+            </a:r>
+            <a:r>
+              <a:rPr lang="de-DE" sz="1600" dirty="0" err="1"/>
+              <a:t>user</a:t>
+            </a:r>
+            <a:endParaRPr lang="de-DE" sz="1600" dirty="0"/>
+          </a:p>
+          <a:p>
+            <a:r>
+              <a:rPr lang="de-DE" sz="1600" dirty="0"/>
+              <a:t>GET	/</a:t>
+            </a:r>
+            <a:r>
+              <a:rPr lang="de-DE" sz="1600" dirty="0" err="1"/>
+              <a:t>organisations</a:t>
+            </a:r>
+            <a:r>
+              <a:rPr lang="de-DE" sz="1600" dirty="0"/>
+              <a:t>/{</a:t>
+            </a:r>
+            <a:r>
+              <a:rPr lang="de-DE" sz="1600" dirty="0" err="1"/>
+              <a:t>OrganisationId</a:t>
+            </a:r>
+            <a:r>
+              <a:rPr lang="de-DE" sz="1600" dirty="0"/>
+              <a:t>}/</a:t>
+            </a:r>
+            <a:r>
+              <a:rPr lang="de-DE" sz="1600" dirty="0" err="1"/>
+              <a:t>users</a:t>
+            </a:r>
+            <a:r>
+              <a:rPr lang="de-DE" sz="1600" dirty="0"/>
+              <a:t>/{</a:t>
+            </a:r>
+            <a:r>
+              <a:rPr lang="de-DE" sz="1600" dirty="0" err="1"/>
+              <a:t>id</a:t>
+            </a:r>
+            <a:r>
+              <a:rPr lang="de-DE" sz="1600" dirty="0"/>
+              <a:t>}		</a:t>
+            </a:r>
+            <a:r>
+              <a:rPr lang="de-DE" sz="1600" dirty="0" err="1"/>
+              <a:t>Gets</a:t>
+            </a:r>
+            <a:r>
+              <a:rPr lang="de-DE" sz="1600" dirty="0"/>
+              <a:t> a </a:t>
+            </a:r>
+            <a:r>
+              <a:rPr lang="de-DE" sz="1600" dirty="0" err="1"/>
+              <a:t>single</a:t>
+            </a:r>
+            <a:r>
+              <a:rPr lang="de-DE" sz="1600" dirty="0"/>
+              <a:t> </a:t>
+            </a:r>
+            <a:r>
+              <a:rPr lang="de-DE" sz="1600" dirty="0" err="1"/>
+              <a:t>organisation</a:t>
+            </a:r>
+            <a:r>
+              <a:rPr lang="de-DE" sz="1600" dirty="0"/>
+              <a:t> </a:t>
+            </a:r>
+            <a:r>
+              <a:rPr lang="de-DE" sz="1600" dirty="0" err="1"/>
+              <a:t>user</a:t>
+            </a:r>
+            <a:r>
+              <a:rPr lang="de-DE" sz="1600" dirty="0"/>
+              <a:t> </a:t>
+            </a:r>
+            <a:r>
+              <a:rPr lang="de-DE" sz="1600" dirty="0" err="1"/>
+              <a:t>by</a:t>
+            </a:r>
+            <a:r>
+              <a:rPr lang="de-DE" sz="1600" dirty="0"/>
+              <a:t> </a:t>
+            </a:r>
+            <a:r>
+              <a:rPr lang="de-DE" sz="1600" dirty="0" err="1"/>
+              <a:t>name</a:t>
+            </a:r>
+            <a:endParaRPr lang="de-DE" sz="1600" dirty="0"/>
+          </a:p>
+          <a:p>
+            <a:endParaRPr lang="de-DE" sz="1600" dirty="0"/>
           </a:p>
         </p:txBody>
       </p:sp>
     </p:spTree>
     <p:extLst>
       <p:ext uri="{BB962C8B-B14F-4D97-AF65-F5344CB8AC3E}">
-        <p14:creationId xmlns:p14="http://schemas.microsoft.com/office/powerpoint/2010/main" val="233169528"/>
+        <p14:creationId xmlns:p14="http://schemas.microsoft.com/office/powerpoint/2010/main" val="4073281005"/>
       </p:ext>
     </p:extLst>
   </p:cSld>
@@ -9174,7 +9105,7 @@
                   <a:srgbClr val="FFFFFF"/>
                 </a:solidFill>
               </a:rPr>
-              <a:t>Schnittstellen: Locale</a:t>
+              <a:t>Schnittstellen: Services</a:t>
             </a:r>
           </a:p>
         </p:txBody>
@@ -9220,23 +9151,7 @@
             </a:r>
             <a:r>
               <a:rPr lang="de-DE" sz="1600" dirty="0"/>
-              <a:t>/{</a:t>
-            </a:r>
-            <a:r>
-              <a:rPr lang="de-DE" sz="1600" dirty="0" err="1"/>
-              <a:t>ServiceId</a:t>
-            </a:r>
-            <a:r>
-              <a:rPr lang="de-DE" sz="1600" dirty="0"/>
-              <a:t>}/</a:t>
-            </a:r>
-            <a:r>
-              <a:rPr lang="de-DE" sz="1600" dirty="0" err="1"/>
-              <a:t>locales</a:t>
-            </a:r>
-            <a:r>
-              <a:rPr lang="de-DE" sz="1600" dirty="0"/>
-              <a:t> 			</a:t>
+              <a:t>					</a:t>
             </a:r>
             <a:r>
               <a:rPr lang="de-DE" sz="1600" dirty="0" err="1"/>
@@ -9252,21 +9167,8 @@
             </a:r>
             <a:r>
               <a:rPr lang="de-DE" sz="1600" dirty="0"/>
-              <a:t> </a:t>
-            </a:r>
-            <a:r>
-              <a:rPr lang="de-DE" sz="1600" dirty="0" err="1"/>
-              <a:t>service</a:t>
-            </a:r>
-            <a:r>
-              <a:rPr lang="de-DE" sz="1600" dirty="0"/>
-              <a:t> </a:t>
-            </a:r>
-            <a:r>
-              <a:rPr lang="de-DE" sz="1600" dirty="0" err="1"/>
-              <a:t>locale</a:t>
-            </a:r>
-            <a:endParaRPr lang="de-DE" sz="1600" dirty="0"/>
+              <a:t> Service / App</a:t>
+            </a:r>
           </a:p>
           <a:p>
             <a:pPr marL="0" indent="0">
@@ -9274,7 +9176,7 @@
             </a:pPr>
             <a:r>
               <a:rPr lang="de-DE" sz="1600" dirty="0"/>
-              <a:t>GET 		/</a:t>
+              <a:t>GET		/</a:t>
             </a:r>
             <a:r>
               <a:rPr lang="de-DE" sz="1600" dirty="0" err="1"/>
@@ -9282,23 +9184,7 @@
             </a:r>
             <a:r>
               <a:rPr lang="de-DE" sz="1600" dirty="0"/>
-              <a:t>/{</a:t>
-            </a:r>
-            <a:r>
-              <a:rPr lang="de-DE" sz="1600" dirty="0" err="1"/>
-              <a:t>ServiceId</a:t>
-            </a:r>
-            <a:r>
-              <a:rPr lang="de-DE" sz="1600" dirty="0"/>
-              <a:t>}/</a:t>
-            </a:r>
-            <a:r>
-              <a:rPr lang="de-DE" sz="1600" dirty="0" err="1"/>
-              <a:t>locales</a:t>
-            </a:r>
-            <a:r>
-              <a:rPr lang="de-DE" sz="1600" dirty="0"/>
-              <a:t> 			</a:t>
+              <a:t>					</a:t>
             </a:r>
             <a:r>
               <a:rPr lang="de-DE" sz="1600" dirty="0" err="1"/>
@@ -9322,21 +9208,8 @@
             </a:r>
             <a:r>
               <a:rPr lang="de-DE" sz="1600" dirty="0"/>
-              <a:t> all </a:t>
-            </a:r>
-            <a:r>
-              <a:rPr lang="de-DE" sz="1600" dirty="0" err="1"/>
-              <a:t>service</a:t>
-            </a:r>
-            <a:r>
-              <a:rPr lang="de-DE" sz="1600" dirty="0"/>
-              <a:t> </a:t>
-            </a:r>
-            <a:r>
-              <a:rPr lang="de-DE" sz="1600" dirty="0" err="1"/>
-              <a:t>locales</a:t>
-            </a:r>
-            <a:endParaRPr lang="de-DE" sz="1600" dirty="0"/>
+              <a:t> all Services / App</a:t>
+            </a:r>
           </a:p>
           <a:p>
             <a:pPr marL="0" indent="0">
@@ -9360,23 +9233,7 @@
             </a:r>
             <a:r>
               <a:rPr lang="de-DE" sz="1600" dirty="0"/>
-              <a:t>}/</a:t>
-            </a:r>
-            <a:r>
-              <a:rPr lang="de-DE" sz="1600" dirty="0" err="1"/>
-              <a:t>locales</a:t>
-            </a:r>
-            <a:r>
-              <a:rPr lang="de-DE" sz="1600" dirty="0"/>
-              <a:t>/{</a:t>
-            </a:r>
-            <a:r>
-              <a:rPr lang="de-DE" sz="1600" dirty="0" err="1"/>
-              <a:t>LocaleCode</a:t>
-            </a:r>
-            <a:r>
-              <a:rPr lang="de-DE" sz="1600" dirty="0"/>
-              <a:t>}		</a:t>
+              <a:t>}				</a:t>
             </a:r>
             <a:r>
               <a:rPr lang="de-DE" sz="1600" dirty="0" err="1"/>
@@ -9384,21 +9241,8 @@
             </a:r>
             <a:r>
               <a:rPr lang="de-DE" sz="1600" dirty="0"/>
-              <a:t> a </a:t>
-            </a:r>
-            <a:r>
-              <a:rPr lang="de-DE" sz="1600" dirty="0" err="1"/>
-              <a:t>service</a:t>
-            </a:r>
-            <a:r>
-              <a:rPr lang="de-DE" sz="1600" dirty="0"/>
-              <a:t> </a:t>
-            </a:r>
-            <a:r>
-              <a:rPr lang="de-DE" sz="1600" dirty="0" err="1"/>
-              <a:t>locale</a:t>
-            </a:r>
-            <a:endParaRPr lang="de-DE" sz="1600" dirty="0"/>
+              <a:t> a Service / App</a:t>
+            </a:r>
           </a:p>
           <a:p>
             <a:pPr marL="0" indent="0">
@@ -9422,23 +9266,7 @@
             </a:r>
             <a:r>
               <a:rPr lang="de-DE" sz="1600" dirty="0"/>
-              <a:t>}/</a:t>
-            </a:r>
-            <a:r>
-              <a:rPr lang="de-DE" sz="1600" dirty="0" err="1"/>
-              <a:t>locales</a:t>
-            </a:r>
-            <a:r>
-              <a:rPr lang="de-DE" sz="1600" dirty="0"/>
-              <a:t>/{</a:t>
-            </a:r>
-            <a:r>
-              <a:rPr lang="de-DE" sz="1600" dirty="0" err="1"/>
-              <a:t>LocaleCode</a:t>
-            </a:r>
-            <a:r>
-              <a:rPr lang="de-DE" sz="1600" dirty="0"/>
-              <a:t>}		</a:t>
+              <a:t>}				</a:t>
             </a:r>
             <a:r>
               <a:rPr lang="de-DE" sz="1600" dirty="0" err="1"/>
@@ -9454,31 +9282,15 @@
             </a:r>
             <a:r>
               <a:rPr lang="de-DE" sz="1600" dirty="0"/>
-              <a:t> </a:t>
-            </a:r>
-            <a:r>
-              <a:rPr lang="de-DE" sz="1600" dirty="0" err="1"/>
-              <a:t>service</a:t>
-            </a:r>
-            <a:r>
-              <a:rPr lang="de-DE" sz="1600" dirty="0"/>
-              <a:t> </a:t>
-            </a:r>
-            <a:r>
-              <a:rPr lang="de-DE" sz="1600" dirty="0" err="1"/>
-              <a:t>locale</a:t>
-            </a:r>
-            <a:endParaRPr lang="de-DE" sz="1600" dirty="0"/>
-          </a:p>
-          <a:p>
-            <a:endParaRPr lang="de-DE" sz="1600" dirty="0"/>
+              <a:t> Service / App</a:t>
+            </a:r>
           </a:p>
         </p:txBody>
       </p:sp>
     </p:spTree>
     <p:extLst>
       <p:ext uri="{BB962C8B-B14F-4D97-AF65-F5344CB8AC3E}">
-        <p14:creationId xmlns:p14="http://schemas.microsoft.com/office/powerpoint/2010/main" val="1319423331"/>
+        <p14:creationId xmlns:p14="http://schemas.microsoft.com/office/powerpoint/2010/main" val="233169528"/>
       </p:ext>
     </p:extLst>
   </p:cSld>
@@ -9610,7 +9422,7 @@
                   <a:srgbClr val="FFFFFF"/>
                 </a:solidFill>
               </a:rPr>
-              <a:t>Schnittstellen: Releases</a:t>
+              <a:t>Schnittstellen: Locale</a:t>
             </a:r>
           </a:p>
         </p:txBody>
@@ -9668,11 +9480,11 @@
             </a:r>
             <a:r>
               <a:rPr lang="de-DE" sz="1600" dirty="0" err="1"/>
-              <a:t>releases</a:t>
-            </a:r>
-            <a:r>
-              <a:rPr lang="de-DE" sz="1600" dirty="0"/>
-              <a:t>			</a:t>
+              <a:t>locales</a:t>
+            </a:r>
+            <a:r>
+              <a:rPr lang="de-DE" sz="1600" dirty="0"/>
+              <a:t> 			</a:t>
             </a:r>
             <a:r>
               <a:rPr lang="de-DE" sz="1600" dirty="0" err="1"/>
@@ -9680,8 +9492,29 @@
             </a:r>
             <a:r>
               <a:rPr lang="de-DE" sz="1600" dirty="0"/>
-              <a:t> a release</a:t>
-            </a:r>
+              <a:t> a </a:t>
+            </a:r>
+            <a:r>
+              <a:rPr lang="de-DE" sz="1600" dirty="0" err="1"/>
+              <a:t>new</a:t>
+            </a:r>
+            <a:r>
+              <a:rPr lang="de-DE" sz="1600" dirty="0"/>
+              <a:t> </a:t>
+            </a:r>
+            <a:r>
+              <a:rPr lang="de-DE" sz="1600" dirty="0" err="1"/>
+              <a:t>service</a:t>
+            </a:r>
+            <a:r>
+              <a:rPr lang="de-DE" sz="1600" dirty="0"/>
+              <a:t> </a:t>
+            </a:r>
+            <a:r>
+              <a:rPr lang="de-DE" sz="1600" dirty="0" err="1"/>
+              <a:t>locale</a:t>
+            </a:r>
+            <a:endParaRPr lang="de-DE" sz="1600" dirty="0"/>
           </a:p>
           <a:p>
             <a:pPr marL="0" indent="0">
@@ -9709,11 +9542,11 @@
             </a:r>
             <a:r>
               <a:rPr lang="de-DE" sz="1600" dirty="0" err="1"/>
-              <a:t>releases</a:t>
-            </a:r>
-            <a:r>
-              <a:rPr lang="de-DE" sz="1600" dirty="0"/>
-              <a:t>			</a:t>
+              <a:t>locales</a:t>
+            </a:r>
+            <a:r>
+              <a:rPr lang="de-DE" sz="1600" dirty="0"/>
+              <a:t> 			</a:t>
             </a:r>
             <a:r>
               <a:rPr lang="de-DE" sz="1600" dirty="0" err="1"/>
@@ -9741,7 +9574,15 @@
             </a:r>
             <a:r>
               <a:rPr lang="de-DE" sz="1600" dirty="0" err="1"/>
-              <a:t>releases</a:t>
+              <a:t>service</a:t>
+            </a:r>
+            <a:r>
+              <a:rPr lang="de-DE" sz="1600" dirty="0"/>
+              <a:t> </a:t>
+            </a:r>
+            <a:r>
+              <a:rPr lang="de-DE" sz="1600" dirty="0" err="1"/>
+              <a:t>locales</a:t>
             </a:r>
             <a:endParaRPr lang="de-DE" sz="1600" dirty="0"/>
           </a:p>
@@ -9771,7 +9612,7 @@
             </a:r>
             <a:r>
               <a:rPr lang="de-DE" sz="1600" dirty="0" err="1"/>
-              <a:t>releases</a:t>
+              <a:t>locales</a:t>
             </a:r>
             <a:r>
               <a:rPr lang="de-DE" sz="1600" dirty="0"/>
@@ -9779,11 +9620,11 @@
             </a:r>
             <a:r>
               <a:rPr lang="de-DE" sz="1600" dirty="0" err="1"/>
-              <a:t>ReleaseId</a:t>
-            </a:r>
-            <a:r>
-              <a:rPr lang="de-DE" sz="1600" dirty="0"/>
-              <a:t>} 		</a:t>
+              <a:t>LocaleCode</a:t>
+            </a:r>
+            <a:r>
+              <a:rPr lang="de-DE" sz="1600" dirty="0"/>
+              <a:t>}		</a:t>
             </a:r>
             <a:r>
               <a:rPr lang="de-DE" sz="1600" dirty="0" err="1"/>
@@ -9791,8 +9632,21 @@
             </a:r>
             <a:r>
               <a:rPr lang="de-DE" sz="1600" dirty="0"/>
-              <a:t> a release</a:t>
-            </a:r>
+              <a:t> a </a:t>
+            </a:r>
+            <a:r>
+              <a:rPr lang="de-DE" sz="1600" dirty="0" err="1"/>
+              <a:t>service</a:t>
+            </a:r>
+            <a:r>
+              <a:rPr lang="de-DE" sz="1600" dirty="0"/>
+              <a:t> </a:t>
+            </a:r>
+            <a:r>
+              <a:rPr lang="de-DE" sz="1600" dirty="0" err="1"/>
+              <a:t>locale</a:t>
+            </a:r>
+            <a:endParaRPr lang="de-DE" sz="1600" dirty="0"/>
           </a:p>
           <a:p>
             <a:pPr marL="0" indent="0">
@@ -9820,7 +9674,7 @@
             </a:r>
             <a:r>
               <a:rPr lang="de-DE" sz="1600" dirty="0" err="1"/>
-              <a:t>releases</a:t>
+              <a:t>locales</a:t>
             </a:r>
             <a:r>
               <a:rPr lang="de-DE" sz="1600" dirty="0"/>
@@ -9828,11 +9682,11 @@
             </a:r>
             <a:r>
               <a:rPr lang="de-DE" sz="1600" dirty="0" err="1"/>
-              <a:t>ReleaseId</a:t>
-            </a:r>
-            <a:r>
-              <a:rPr lang="de-DE" sz="1600" dirty="0"/>
-              <a:t>} 		</a:t>
+              <a:t>LocaleCode</a:t>
+            </a:r>
+            <a:r>
+              <a:rPr lang="de-DE" sz="1600" dirty="0"/>
+              <a:t>}		</a:t>
             </a:r>
             <a:r>
               <a:rPr lang="de-DE" sz="1600" dirty="0" err="1"/>
@@ -9848,15 +9702,31 @@
             </a:r>
             <a:r>
               <a:rPr lang="de-DE" sz="1600" dirty="0"/>
-              <a:t> release</a:t>
-            </a:r>
+              <a:t> </a:t>
+            </a:r>
+            <a:r>
+              <a:rPr lang="de-DE" sz="1600" dirty="0" err="1"/>
+              <a:t>service</a:t>
+            </a:r>
+            <a:r>
+              <a:rPr lang="de-DE" sz="1600" dirty="0"/>
+              <a:t> </a:t>
+            </a:r>
+            <a:r>
+              <a:rPr lang="de-DE" sz="1600" dirty="0" err="1"/>
+              <a:t>locale</a:t>
+            </a:r>
+            <a:endParaRPr lang="de-DE" sz="1600" dirty="0"/>
+          </a:p>
+          <a:p>
+            <a:endParaRPr lang="de-DE" sz="1600" dirty="0"/>
           </a:p>
         </p:txBody>
       </p:sp>
     </p:spTree>
     <p:extLst>
       <p:ext uri="{BB962C8B-B14F-4D97-AF65-F5344CB8AC3E}">
-        <p14:creationId xmlns:p14="http://schemas.microsoft.com/office/powerpoint/2010/main" val="3347013304"/>
+        <p14:creationId xmlns:p14="http://schemas.microsoft.com/office/powerpoint/2010/main" val="1319423331"/>
       </p:ext>
     </p:extLst>
   </p:cSld>
@@ -9988,7 +9858,7 @@
                   <a:srgbClr val="FFFFFF"/>
                 </a:solidFill>
               </a:rPr>
-              <a:t>Architektur: Technologien Frontend</a:t>
+              <a:t>Schnittstellen: Releases</a:t>
             </a:r>
           </a:p>
         </p:txBody>
@@ -10021,280 +9891,220 @@
           </a:bodyPr>
           <a:lstStyle/>
           <a:p>
-            <a:r>
-              <a:rPr lang="de-DE" sz="2600" dirty="0" err="1"/>
-              <a:t>React</a:t>
-            </a:r>
-            <a:endParaRPr lang="de-DE" sz="2600" dirty="0"/>
-          </a:p>
-          <a:p>
-            <a:r>
-              <a:rPr lang="de-DE" sz="2600" dirty="0" err="1"/>
-              <a:t>React</a:t>
-            </a:r>
-            <a:r>
-              <a:rPr lang="de-DE" sz="2600" dirty="0"/>
-              <a:t>-Router</a:t>
-            </a:r>
-          </a:p>
-          <a:p>
-            <a:r>
-              <a:rPr lang="de-DE" sz="2600" dirty="0" err="1"/>
-              <a:t>Typescript</a:t>
-            </a:r>
-            <a:endParaRPr lang="de-DE" sz="2600" dirty="0"/>
-          </a:p>
-          <a:p>
-            <a:r>
-              <a:rPr lang="de-DE" sz="2600" dirty="0"/>
-              <a:t>Material-UI</a:t>
-            </a:r>
-          </a:p>
-          <a:p>
-            <a:r>
-              <a:rPr lang="de-DE" sz="2600" dirty="0" err="1"/>
-              <a:t>Formik</a:t>
-            </a:r>
-            <a:endParaRPr lang="de-DE" sz="2600" dirty="0"/>
-          </a:p>
-          <a:p>
-            <a:r>
-              <a:rPr lang="de-DE" sz="2600" dirty="0" err="1"/>
-              <a:t>Zod</a:t>
-            </a:r>
-            <a:endParaRPr lang="de-DE" sz="2600" dirty="0"/>
-          </a:p>
-        </p:txBody>
-      </p:sp>
-      <p:pic>
-        <p:nvPicPr>
-          <p:cNvPr id="5" name="Grafik 4">
-            <a:extLst>
-              <a:ext uri="{FF2B5EF4-FFF2-40B4-BE49-F238E27FC236}">
-                <a16:creationId xmlns:a16="http://schemas.microsoft.com/office/drawing/2014/main" id="{5B756828-10BC-DA4E-C1AA-B99F9864BCA8}"/>
-              </a:ext>
-            </a:extLst>
-          </p:cNvPr>
-          <p:cNvPicPr>
-            <a:picLocks noChangeAspect="1"/>
-          </p:cNvPicPr>
-          <p:nvPr/>
-        </p:nvPicPr>
-        <p:blipFill>
-          <a:blip r:embed="rId2">
-            <a:extLst>
-              <a:ext uri="{28A0092B-C50C-407E-A947-70E740481C1C}">
-                <a14:useLocalDpi xmlns:a14="http://schemas.microsoft.com/office/drawing/2010/main" val="0"/>
-              </a:ext>
-              <a:ext uri="{96DAC541-7B7A-43D3-8B79-37D633B846F1}">
-                <asvg:svgBlip xmlns:asvg="http://schemas.microsoft.com/office/drawing/2016/SVG/main" r:embed="rId3"/>
-              </a:ext>
-            </a:extLst>
-          </a:blip>
-          <a:stretch>
-            <a:fillRect/>
-          </a:stretch>
-        </p:blipFill>
-        <p:spPr>
-          <a:xfrm>
-            <a:off x="5399402" y="2276475"/>
-            <a:ext cx="1020060" cy="887008"/>
-          </a:xfrm>
-          <a:prstGeom prst="rect">
-            <a:avLst/>
-          </a:prstGeom>
-        </p:spPr>
-      </p:pic>
-      <p:pic>
-        <p:nvPicPr>
-          <p:cNvPr id="7" name="Grafik 6">
-            <a:extLst>
-              <a:ext uri="{FF2B5EF4-FFF2-40B4-BE49-F238E27FC236}">
-                <a16:creationId xmlns:a16="http://schemas.microsoft.com/office/drawing/2014/main" id="{13EE0439-8B94-64F7-5EDF-C71B4E5FE3CC}"/>
-              </a:ext>
-            </a:extLst>
-          </p:cNvPr>
-          <p:cNvPicPr>
-            <a:picLocks noChangeAspect="1"/>
-          </p:cNvPicPr>
-          <p:nvPr/>
-        </p:nvPicPr>
-        <p:blipFill>
-          <a:blip r:embed="rId4">
-            <a:extLst>
-              <a:ext uri="{28A0092B-C50C-407E-A947-70E740481C1C}">
-                <a14:useLocalDpi xmlns:a14="http://schemas.microsoft.com/office/drawing/2010/main" val="0"/>
-              </a:ext>
-            </a:extLst>
-          </a:blip>
-          <a:stretch>
-            <a:fillRect/>
-          </a:stretch>
-        </p:blipFill>
-        <p:spPr>
-          <a:xfrm>
-            <a:off x="8887852" y="2217738"/>
-            <a:ext cx="1632530" cy="887008"/>
-          </a:xfrm>
-          <a:prstGeom prst="rect">
-            <a:avLst/>
-          </a:prstGeom>
-        </p:spPr>
-      </p:pic>
-      <p:pic>
-        <p:nvPicPr>
-          <p:cNvPr id="9" name="Grafik 8">
-            <a:extLst>
-              <a:ext uri="{FF2B5EF4-FFF2-40B4-BE49-F238E27FC236}">
-                <a16:creationId xmlns:a16="http://schemas.microsoft.com/office/drawing/2014/main" id="{FE712FF4-3375-6971-A3E6-A17BBF84426C}"/>
-              </a:ext>
-            </a:extLst>
-          </p:cNvPr>
-          <p:cNvPicPr>
-            <a:picLocks noChangeAspect="1"/>
-          </p:cNvPicPr>
-          <p:nvPr/>
-        </p:nvPicPr>
-        <p:blipFill>
-          <a:blip r:embed="rId5">
-            <a:extLst>
-              <a:ext uri="{28A0092B-C50C-407E-A947-70E740481C1C}">
-                <a14:useLocalDpi xmlns:a14="http://schemas.microsoft.com/office/drawing/2010/main" val="0"/>
-              </a:ext>
-              <a:ext uri="{96DAC541-7B7A-43D3-8B79-37D633B846F1}">
-                <asvg:svgBlip xmlns:asvg="http://schemas.microsoft.com/office/drawing/2016/SVG/main" r:embed="rId6"/>
-              </a:ext>
-            </a:extLst>
-          </a:blip>
-          <a:stretch>
-            <a:fillRect/>
-          </a:stretch>
-        </p:blipFill>
-        <p:spPr>
-          <a:xfrm>
-            <a:off x="3786216" y="3859810"/>
-            <a:ext cx="979414" cy="979414"/>
-          </a:xfrm>
-          <a:prstGeom prst="rect">
-            <a:avLst/>
-          </a:prstGeom>
-        </p:spPr>
-      </p:pic>
-      <p:pic>
-        <p:nvPicPr>
-          <p:cNvPr id="11" name="Grafik 10">
-            <a:extLst>
-              <a:ext uri="{FF2B5EF4-FFF2-40B4-BE49-F238E27FC236}">
-                <a16:creationId xmlns:a16="http://schemas.microsoft.com/office/drawing/2014/main" id="{AD21B4CB-09FF-E085-FFA6-B421AC80C693}"/>
-              </a:ext>
-            </a:extLst>
-          </p:cNvPr>
-          <p:cNvPicPr>
-            <a:picLocks noChangeAspect="1"/>
-          </p:cNvPicPr>
-          <p:nvPr/>
-        </p:nvPicPr>
-        <p:blipFill>
-          <a:blip r:embed="rId7">
-            <a:extLst>
-              <a:ext uri="{28A0092B-C50C-407E-A947-70E740481C1C}">
-                <a14:useLocalDpi xmlns:a14="http://schemas.microsoft.com/office/drawing/2010/main" val="0"/>
-              </a:ext>
-            </a:extLst>
-          </a:blip>
-          <a:stretch>
-            <a:fillRect/>
-          </a:stretch>
-        </p:blipFill>
-        <p:spPr>
-          <a:xfrm>
-            <a:off x="7284205" y="3250913"/>
-            <a:ext cx="1149272" cy="1149272"/>
-          </a:xfrm>
-          <a:prstGeom prst="rect">
-            <a:avLst/>
-          </a:prstGeom>
-        </p:spPr>
-      </p:pic>
-      <p:pic>
-        <p:nvPicPr>
-          <p:cNvPr id="13" name="Grafik 12">
-            <a:extLst>
-              <a:ext uri="{FF2B5EF4-FFF2-40B4-BE49-F238E27FC236}">
-                <a16:creationId xmlns:a16="http://schemas.microsoft.com/office/drawing/2014/main" id="{E71022A8-831A-946E-631F-A430C2B32A62}"/>
-              </a:ext>
-            </a:extLst>
-          </p:cNvPr>
-          <p:cNvPicPr>
-            <a:picLocks noChangeAspect="1"/>
-          </p:cNvPicPr>
-          <p:nvPr/>
-        </p:nvPicPr>
-        <p:blipFill>
-          <a:blip r:embed="rId8">
-            <a:extLst>
-              <a:ext uri="{28A0092B-C50C-407E-A947-70E740481C1C}">
-                <a14:useLocalDpi xmlns:a14="http://schemas.microsoft.com/office/drawing/2010/main" val="0"/>
-              </a:ext>
-            </a:extLst>
-          </a:blip>
-          <a:stretch>
-            <a:fillRect/>
-          </a:stretch>
-        </p:blipFill>
-        <p:spPr>
-          <a:xfrm>
-            <a:off x="9077640" y="4907900"/>
-            <a:ext cx="1252955" cy="1081155"/>
-          </a:xfrm>
-          <a:prstGeom prst="rect">
-            <a:avLst/>
-          </a:prstGeom>
-        </p:spPr>
-      </p:pic>
-      <p:pic>
-        <p:nvPicPr>
-          <p:cNvPr id="18" name="Grafik 17">
-            <a:extLst>
-              <a:ext uri="{FF2B5EF4-FFF2-40B4-BE49-F238E27FC236}">
-                <a16:creationId xmlns:a16="http://schemas.microsoft.com/office/drawing/2014/main" id="{191DD37A-9875-5EA2-702D-4A87A5E32AA8}"/>
-              </a:ext>
-            </a:extLst>
-          </p:cNvPr>
-          <p:cNvPicPr>
-            <a:picLocks noChangeAspect="1"/>
-          </p:cNvPicPr>
-          <p:nvPr/>
-        </p:nvPicPr>
-        <p:blipFill>
-          <a:blip r:embed="rId9">
-            <a:extLst>
-              <a:ext uri="{28A0092B-C50C-407E-A947-70E740481C1C}">
-                <a14:useLocalDpi xmlns:a14="http://schemas.microsoft.com/office/drawing/2010/main" val="0"/>
-              </a:ext>
-              <a:ext uri="{96DAC541-7B7A-43D3-8B79-37D633B846F1}">
-                <asvg:svgBlip xmlns:asvg="http://schemas.microsoft.com/office/drawing/2016/SVG/main" r:embed="rId10"/>
-              </a:ext>
-            </a:extLst>
-          </a:blip>
-          <a:stretch>
-            <a:fillRect/>
-          </a:stretch>
-        </p:blipFill>
-        <p:spPr>
-          <a:xfrm>
-            <a:off x="5399402" y="5156906"/>
-            <a:ext cx="1453896" cy="1453896"/>
-          </a:xfrm>
-          <a:prstGeom prst="rect">
-            <a:avLst/>
-          </a:prstGeom>
-        </p:spPr>
-      </p:pic>
+            <a:pPr marL="0" indent="0">
+              <a:buNone/>
+            </a:pPr>
+            <a:r>
+              <a:rPr lang="de-DE" sz="1600" dirty="0"/>
+              <a:t>POST		/</a:t>
+            </a:r>
+            <a:r>
+              <a:rPr lang="de-DE" sz="1600" dirty="0" err="1"/>
+              <a:t>services</a:t>
+            </a:r>
+            <a:r>
+              <a:rPr lang="de-DE" sz="1600" dirty="0"/>
+              <a:t>/{</a:t>
+            </a:r>
+            <a:r>
+              <a:rPr lang="de-DE" sz="1600" dirty="0" err="1"/>
+              <a:t>ServiceId</a:t>
+            </a:r>
+            <a:r>
+              <a:rPr lang="de-DE" sz="1600" dirty="0"/>
+              <a:t>}/</a:t>
+            </a:r>
+            <a:r>
+              <a:rPr lang="de-DE" sz="1600" dirty="0" err="1"/>
+              <a:t>releases</a:t>
+            </a:r>
+            <a:r>
+              <a:rPr lang="de-DE" sz="1600" dirty="0"/>
+              <a:t>			</a:t>
+            </a:r>
+            <a:r>
+              <a:rPr lang="de-DE" sz="1600" dirty="0" err="1"/>
+              <a:t>Creates</a:t>
+            </a:r>
+            <a:r>
+              <a:rPr lang="de-DE" sz="1600" dirty="0"/>
+              <a:t> a release</a:t>
+            </a:r>
+          </a:p>
+          <a:p>
+            <a:pPr marL="0" indent="0">
+              <a:buNone/>
+            </a:pPr>
+            <a:r>
+              <a:rPr lang="de-DE" sz="1600" dirty="0"/>
+              <a:t>GET 		/</a:t>
+            </a:r>
+            <a:r>
+              <a:rPr lang="de-DE" sz="1600" dirty="0" err="1"/>
+              <a:t>services</a:t>
+            </a:r>
+            <a:r>
+              <a:rPr lang="de-DE" sz="1600" dirty="0"/>
+              <a:t>/{</a:t>
+            </a:r>
+            <a:r>
+              <a:rPr lang="de-DE" sz="1600" dirty="0" err="1"/>
+              <a:t>ServiceId</a:t>
+            </a:r>
+            <a:r>
+              <a:rPr lang="de-DE" sz="1600" dirty="0"/>
+              <a:t>}/</a:t>
+            </a:r>
+            <a:r>
+              <a:rPr lang="de-DE" sz="1600" dirty="0" err="1"/>
+              <a:t>releases</a:t>
+            </a:r>
+            <a:r>
+              <a:rPr lang="de-DE" sz="1600" dirty="0"/>
+              <a:t>			</a:t>
+            </a:r>
+            <a:r>
+              <a:rPr lang="de-DE" sz="1600" dirty="0" err="1"/>
+              <a:t>Gets</a:t>
+            </a:r>
+            <a:r>
+              <a:rPr lang="de-DE" sz="1600" dirty="0"/>
+              <a:t> a </a:t>
+            </a:r>
+            <a:r>
+              <a:rPr lang="de-DE" sz="1600" dirty="0" err="1"/>
+              <a:t>list</a:t>
+            </a:r>
+            <a:r>
+              <a:rPr lang="de-DE" sz="1600" dirty="0"/>
+              <a:t> </a:t>
+            </a:r>
+            <a:r>
+              <a:rPr lang="de-DE" sz="1600" dirty="0" err="1"/>
+              <a:t>of</a:t>
+            </a:r>
+            <a:r>
+              <a:rPr lang="de-DE" sz="1600" dirty="0"/>
+              <a:t> all </a:t>
+            </a:r>
+            <a:r>
+              <a:rPr lang="de-DE" sz="1600" dirty="0" err="1"/>
+              <a:t>releases</a:t>
+            </a:r>
+            <a:endParaRPr lang="de-DE" sz="1600" dirty="0"/>
+          </a:p>
+          <a:p>
+            <a:pPr marL="0" indent="0">
+              <a:buNone/>
+            </a:pPr>
+            <a:r>
+              <a:rPr lang="de-DE" sz="1600" dirty="0"/>
+              <a:t>DELETE		/</a:t>
+            </a:r>
+            <a:r>
+              <a:rPr lang="de-DE" sz="1600" dirty="0" err="1"/>
+              <a:t>services</a:t>
+            </a:r>
+            <a:r>
+              <a:rPr lang="de-DE" sz="1600" dirty="0"/>
+              <a:t>/{</a:t>
+            </a:r>
+            <a:r>
+              <a:rPr lang="de-DE" sz="1600" dirty="0" err="1"/>
+              <a:t>ServiceId</a:t>
+            </a:r>
+            <a:r>
+              <a:rPr lang="de-DE" sz="1600" dirty="0"/>
+              <a:t>}/</a:t>
+            </a:r>
+            <a:r>
+              <a:rPr lang="de-DE" sz="1600" dirty="0" err="1"/>
+              <a:t>releases</a:t>
+            </a:r>
+            <a:r>
+              <a:rPr lang="de-DE" sz="1600" dirty="0"/>
+              <a:t>/{</a:t>
+            </a:r>
+            <a:r>
+              <a:rPr lang="de-DE" sz="1600" dirty="0" err="1"/>
+              <a:t>ReleaseId</a:t>
+            </a:r>
+            <a:r>
+              <a:rPr lang="de-DE" sz="1600" dirty="0"/>
+              <a:t>} 		</a:t>
+            </a:r>
+            <a:r>
+              <a:rPr lang="de-DE" sz="1600" dirty="0" err="1"/>
+              <a:t>Deletes</a:t>
+            </a:r>
+            <a:r>
+              <a:rPr lang="de-DE" sz="1600" dirty="0"/>
+              <a:t> a release</a:t>
+            </a:r>
+          </a:p>
+          <a:p>
+            <a:pPr marL="0" indent="0">
+              <a:buNone/>
+            </a:pPr>
+            <a:r>
+              <a:rPr lang="de-DE" sz="1600" dirty="0"/>
+              <a:t>GET		/</a:t>
+            </a:r>
+            <a:r>
+              <a:rPr lang="de-DE" sz="1600" dirty="0" err="1"/>
+              <a:t>services</a:t>
+            </a:r>
+            <a:r>
+              <a:rPr lang="de-DE" sz="1600" dirty="0"/>
+              <a:t>/{</a:t>
+            </a:r>
+            <a:r>
+              <a:rPr lang="de-DE" sz="1600" dirty="0" err="1"/>
+              <a:t>ServiceId</a:t>
+            </a:r>
+            <a:r>
+              <a:rPr lang="de-DE" sz="1600" dirty="0"/>
+              <a:t>}/</a:t>
+            </a:r>
+            <a:r>
+              <a:rPr lang="de-DE" sz="1600" dirty="0" err="1"/>
+              <a:t>releases</a:t>
+            </a:r>
+            <a:r>
+              <a:rPr lang="de-DE" sz="1600" dirty="0"/>
+              <a:t>/{</a:t>
+            </a:r>
+            <a:r>
+              <a:rPr lang="de-DE" sz="1600" dirty="0" err="1"/>
+              <a:t>ReleaseId</a:t>
+            </a:r>
+            <a:r>
+              <a:rPr lang="de-DE" sz="1600" dirty="0"/>
+              <a:t>} 		</a:t>
+            </a:r>
+            <a:r>
+              <a:rPr lang="de-DE" sz="1600" dirty="0" err="1"/>
+              <a:t>Gets</a:t>
+            </a:r>
+            <a:r>
+              <a:rPr lang="de-DE" sz="1600" dirty="0"/>
+              <a:t> a </a:t>
+            </a:r>
+            <a:r>
+              <a:rPr lang="de-DE" sz="1600" dirty="0" err="1"/>
+              <a:t>single</a:t>
+            </a:r>
+            <a:r>
+              <a:rPr lang="de-DE" sz="1600" dirty="0"/>
+              <a:t> release</a:t>
+            </a:r>
+          </a:p>
+        </p:txBody>
+      </p:sp>
     </p:spTree>
     <p:extLst>
       <p:ext uri="{BB962C8B-B14F-4D97-AF65-F5344CB8AC3E}">
-        <p14:creationId xmlns:p14="http://schemas.microsoft.com/office/powerpoint/2010/main" val="856422870"/>
+        <p14:creationId xmlns:p14="http://schemas.microsoft.com/office/powerpoint/2010/main" val="3347013304"/>
       </p:ext>
     </p:extLst>
   </p:cSld>
@@ -10620,7 +10430,7 @@
       </p:grpSpPr>
       <p:sp>
         <p:nvSpPr>
-          <p:cNvPr id="8" name="Rectangle 7">
+          <p:cNvPr id="15" name="Rectangle 12">
             <a:extLst>
               <a:ext uri="{FF2B5EF4-FFF2-40B4-BE49-F238E27FC236}">
                 <a16:creationId xmlns:a16="http://schemas.microsoft.com/office/drawing/2014/main" id="{DE7FFD28-545C-4C88-A2E7-152FB234C92C}"/>
@@ -10686,6 +10496,444 @@
           <p:cNvPr id="2" name="Titel 1">
             <a:extLst>
               <a:ext uri="{FF2B5EF4-FFF2-40B4-BE49-F238E27FC236}">
+                <a16:creationId xmlns:a16="http://schemas.microsoft.com/office/drawing/2014/main" id="{E2225078-0A48-A412-1E44-6A11DCAF925C}"/>
+              </a:ext>
+            </a:extLst>
+          </p:cNvPr>
+          <p:cNvSpPr>
+            <a:spLocks noGrp="1"/>
+          </p:cNvSpPr>
+          <p:nvPr>
+            <p:ph type="title"/>
+          </p:nvPr>
+        </p:nvSpPr>
+        <p:spPr>
+          <a:xfrm>
+            <a:off x="838200" y="365125"/>
+            <a:ext cx="10515600" cy="1325563"/>
+          </a:xfrm>
+        </p:spPr>
+        <p:txBody>
+          <a:bodyPr>
+            <a:normAutofit/>
+          </a:bodyPr>
+          <a:lstStyle/>
+          <a:p>
+            <a:r>
+              <a:rPr lang="de-DE" sz="4600" dirty="0">
+                <a:solidFill>
+                  <a:srgbClr val="FFFFFF"/>
+                </a:solidFill>
+              </a:rPr>
+              <a:t>Architektur: Technologien Frontend</a:t>
+            </a:r>
+          </a:p>
+        </p:txBody>
+      </p:sp>
+      <p:sp>
+        <p:nvSpPr>
+          <p:cNvPr id="3" name="Inhaltsplatzhalter 2">
+            <a:extLst>
+              <a:ext uri="{FF2B5EF4-FFF2-40B4-BE49-F238E27FC236}">
+                <a16:creationId xmlns:a16="http://schemas.microsoft.com/office/drawing/2014/main" id="{F885A8B1-6ACB-212B-46D3-63CC7536063C}"/>
+              </a:ext>
+            </a:extLst>
+          </p:cNvPr>
+          <p:cNvSpPr>
+            <a:spLocks noGrp="1"/>
+          </p:cNvSpPr>
+          <p:nvPr>
+            <p:ph idx="1"/>
+          </p:nvPr>
+        </p:nvSpPr>
+        <p:spPr>
+          <a:xfrm>
+            <a:off x="838200" y="2438400"/>
+            <a:ext cx="10515600" cy="3738562"/>
+          </a:xfrm>
+        </p:spPr>
+        <p:txBody>
+          <a:bodyPr>
+            <a:normAutofit/>
+          </a:bodyPr>
+          <a:lstStyle/>
+          <a:p>
+            <a:r>
+              <a:rPr lang="de-DE" sz="2600" dirty="0" err="1"/>
+              <a:t>React</a:t>
+            </a:r>
+            <a:endParaRPr lang="de-DE" sz="2600" dirty="0"/>
+          </a:p>
+          <a:p>
+            <a:r>
+              <a:rPr lang="de-DE" sz="2600" dirty="0" err="1"/>
+              <a:t>React</a:t>
+            </a:r>
+            <a:r>
+              <a:rPr lang="de-DE" sz="2600" dirty="0"/>
+              <a:t>-Router</a:t>
+            </a:r>
+          </a:p>
+          <a:p>
+            <a:r>
+              <a:rPr lang="de-DE" sz="2600" dirty="0" err="1"/>
+              <a:t>Typescript</a:t>
+            </a:r>
+            <a:endParaRPr lang="de-DE" sz="2600" dirty="0"/>
+          </a:p>
+          <a:p>
+            <a:r>
+              <a:rPr lang="de-DE" sz="2600" dirty="0"/>
+              <a:t>Material-UI</a:t>
+            </a:r>
+          </a:p>
+          <a:p>
+            <a:r>
+              <a:rPr lang="de-DE" sz="2600" dirty="0" err="1"/>
+              <a:t>Formik</a:t>
+            </a:r>
+            <a:endParaRPr lang="de-DE" sz="2600" dirty="0"/>
+          </a:p>
+          <a:p>
+            <a:r>
+              <a:rPr lang="de-DE" sz="2600" dirty="0" err="1"/>
+              <a:t>Zod</a:t>
+            </a:r>
+            <a:endParaRPr lang="de-DE" sz="2600" dirty="0"/>
+          </a:p>
+        </p:txBody>
+      </p:sp>
+      <p:pic>
+        <p:nvPicPr>
+          <p:cNvPr id="5" name="Grafik 4">
+            <a:extLst>
+              <a:ext uri="{FF2B5EF4-FFF2-40B4-BE49-F238E27FC236}">
+                <a16:creationId xmlns:a16="http://schemas.microsoft.com/office/drawing/2014/main" id="{5B756828-10BC-DA4E-C1AA-B99F9864BCA8}"/>
+              </a:ext>
+            </a:extLst>
+          </p:cNvPr>
+          <p:cNvPicPr>
+            <a:picLocks noChangeAspect="1"/>
+          </p:cNvPicPr>
+          <p:nvPr/>
+        </p:nvPicPr>
+        <p:blipFill>
+          <a:blip r:embed="rId2">
+            <a:extLst>
+              <a:ext uri="{28A0092B-C50C-407E-A947-70E740481C1C}">
+                <a14:useLocalDpi xmlns:a14="http://schemas.microsoft.com/office/drawing/2010/main" val="0"/>
+              </a:ext>
+              <a:ext uri="{96DAC541-7B7A-43D3-8B79-37D633B846F1}">
+                <asvg:svgBlip xmlns:asvg="http://schemas.microsoft.com/office/drawing/2016/SVG/main" r:embed="rId3"/>
+              </a:ext>
+            </a:extLst>
+          </a:blip>
+          <a:stretch>
+            <a:fillRect/>
+          </a:stretch>
+        </p:blipFill>
+        <p:spPr>
+          <a:xfrm>
+            <a:off x="5399402" y="2276475"/>
+            <a:ext cx="1020060" cy="887008"/>
+          </a:xfrm>
+          <a:prstGeom prst="rect">
+            <a:avLst/>
+          </a:prstGeom>
+        </p:spPr>
+      </p:pic>
+      <p:pic>
+        <p:nvPicPr>
+          <p:cNvPr id="7" name="Grafik 6">
+            <a:extLst>
+              <a:ext uri="{FF2B5EF4-FFF2-40B4-BE49-F238E27FC236}">
+                <a16:creationId xmlns:a16="http://schemas.microsoft.com/office/drawing/2014/main" id="{13EE0439-8B94-64F7-5EDF-C71B4E5FE3CC}"/>
+              </a:ext>
+            </a:extLst>
+          </p:cNvPr>
+          <p:cNvPicPr>
+            <a:picLocks noChangeAspect="1"/>
+          </p:cNvPicPr>
+          <p:nvPr/>
+        </p:nvPicPr>
+        <p:blipFill>
+          <a:blip r:embed="rId4">
+            <a:extLst>
+              <a:ext uri="{28A0092B-C50C-407E-A947-70E740481C1C}">
+                <a14:useLocalDpi xmlns:a14="http://schemas.microsoft.com/office/drawing/2010/main" val="0"/>
+              </a:ext>
+            </a:extLst>
+          </a:blip>
+          <a:stretch>
+            <a:fillRect/>
+          </a:stretch>
+        </p:blipFill>
+        <p:spPr>
+          <a:xfrm>
+            <a:off x="8887852" y="2217738"/>
+            <a:ext cx="1632530" cy="887008"/>
+          </a:xfrm>
+          <a:prstGeom prst="rect">
+            <a:avLst/>
+          </a:prstGeom>
+        </p:spPr>
+      </p:pic>
+      <p:pic>
+        <p:nvPicPr>
+          <p:cNvPr id="9" name="Grafik 8">
+            <a:extLst>
+              <a:ext uri="{FF2B5EF4-FFF2-40B4-BE49-F238E27FC236}">
+                <a16:creationId xmlns:a16="http://schemas.microsoft.com/office/drawing/2014/main" id="{FE712FF4-3375-6971-A3E6-A17BBF84426C}"/>
+              </a:ext>
+            </a:extLst>
+          </p:cNvPr>
+          <p:cNvPicPr>
+            <a:picLocks noChangeAspect="1"/>
+          </p:cNvPicPr>
+          <p:nvPr/>
+        </p:nvPicPr>
+        <p:blipFill>
+          <a:blip r:embed="rId5">
+            <a:extLst>
+              <a:ext uri="{28A0092B-C50C-407E-A947-70E740481C1C}">
+                <a14:useLocalDpi xmlns:a14="http://schemas.microsoft.com/office/drawing/2010/main" val="0"/>
+              </a:ext>
+              <a:ext uri="{96DAC541-7B7A-43D3-8B79-37D633B846F1}">
+                <asvg:svgBlip xmlns:asvg="http://schemas.microsoft.com/office/drawing/2016/SVG/main" r:embed="rId6"/>
+              </a:ext>
+            </a:extLst>
+          </a:blip>
+          <a:stretch>
+            <a:fillRect/>
+          </a:stretch>
+        </p:blipFill>
+        <p:spPr>
+          <a:xfrm>
+            <a:off x="3786216" y="3859810"/>
+            <a:ext cx="979414" cy="979414"/>
+          </a:xfrm>
+          <a:prstGeom prst="rect">
+            <a:avLst/>
+          </a:prstGeom>
+        </p:spPr>
+      </p:pic>
+      <p:pic>
+        <p:nvPicPr>
+          <p:cNvPr id="11" name="Grafik 10">
+            <a:extLst>
+              <a:ext uri="{FF2B5EF4-FFF2-40B4-BE49-F238E27FC236}">
+                <a16:creationId xmlns:a16="http://schemas.microsoft.com/office/drawing/2014/main" id="{AD21B4CB-09FF-E085-FFA6-B421AC80C693}"/>
+              </a:ext>
+            </a:extLst>
+          </p:cNvPr>
+          <p:cNvPicPr>
+            <a:picLocks noChangeAspect="1"/>
+          </p:cNvPicPr>
+          <p:nvPr/>
+        </p:nvPicPr>
+        <p:blipFill>
+          <a:blip r:embed="rId7">
+            <a:extLst>
+              <a:ext uri="{28A0092B-C50C-407E-A947-70E740481C1C}">
+                <a14:useLocalDpi xmlns:a14="http://schemas.microsoft.com/office/drawing/2010/main" val="0"/>
+              </a:ext>
+            </a:extLst>
+          </a:blip>
+          <a:stretch>
+            <a:fillRect/>
+          </a:stretch>
+        </p:blipFill>
+        <p:spPr>
+          <a:xfrm>
+            <a:off x="7284205" y="3250913"/>
+            <a:ext cx="1149272" cy="1149272"/>
+          </a:xfrm>
+          <a:prstGeom prst="rect">
+            <a:avLst/>
+          </a:prstGeom>
+        </p:spPr>
+      </p:pic>
+      <p:pic>
+        <p:nvPicPr>
+          <p:cNvPr id="13" name="Grafik 12">
+            <a:extLst>
+              <a:ext uri="{FF2B5EF4-FFF2-40B4-BE49-F238E27FC236}">
+                <a16:creationId xmlns:a16="http://schemas.microsoft.com/office/drawing/2014/main" id="{E71022A8-831A-946E-631F-A430C2B32A62}"/>
+              </a:ext>
+            </a:extLst>
+          </p:cNvPr>
+          <p:cNvPicPr>
+            <a:picLocks noChangeAspect="1"/>
+          </p:cNvPicPr>
+          <p:nvPr/>
+        </p:nvPicPr>
+        <p:blipFill>
+          <a:blip r:embed="rId8">
+            <a:extLst>
+              <a:ext uri="{28A0092B-C50C-407E-A947-70E740481C1C}">
+                <a14:useLocalDpi xmlns:a14="http://schemas.microsoft.com/office/drawing/2010/main" val="0"/>
+              </a:ext>
+            </a:extLst>
+          </a:blip>
+          <a:stretch>
+            <a:fillRect/>
+          </a:stretch>
+        </p:blipFill>
+        <p:spPr>
+          <a:xfrm>
+            <a:off x="9077640" y="4907900"/>
+            <a:ext cx="1252955" cy="1081155"/>
+          </a:xfrm>
+          <a:prstGeom prst="rect">
+            <a:avLst/>
+          </a:prstGeom>
+        </p:spPr>
+      </p:pic>
+      <p:pic>
+        <p:nvPicPr>
+          <p:cNvPr id="18" name="Grafik 17">
+            <a:extLst>
+              <a:ext uri="{FF2B5EF4-FFF2-40B4-BE49-F238E27FC236}">
+                <a16:creationId xmlns:a16="http://schemas.microsoft.com/office/drawing/2014/main" id="{191DD37A-9875-5EA2-702D-4A87A5E32AA8}"/>
+              </a:ext>
+            </a:extLst>
+          </p:cNvPr>
+          <p:cNvPicPr>
+            <a:picLocks noChangeAspect="1"/>
+          </p:cNvPicPr>
+          <p:nvPr/>
+        </p:nvPicPr>
+        <p:blipFill>
+          <a:blip r:embed="rId9">
+            <a:extLst>
+              <a:ext uri="{28A0092B-C50C-407E-A947-70E740481C1C}">
+                <a14:useLocalDpi xmlns:a14="http://schemas.microsoft.com/office/drawing/2010/main" val="0"/>
+              </a:ext>
+              <a:ext uri="{96DAC541-7B7A-43D3-8B79-37D633B846F1}">
+                <asvg:svgBlip xmlns:asvg="http://schemas.microsoft.com/office/drawing/2016/SVG/main" r:embed="rId10"/>
+              </a:ext>
+            </a:extLst>
+          </a:blip>
+          <a:stretch>
+            <a:fillRect/>
+          </a:stretch>
+        </p:blipFill>
+        <p:spPr>
+          <a:xfrm>
+            <a:off x="5399402" y="5156906"/>
+            <a:ext cx="1453896" cy="1453896"/>
+          </a:xfrm>
+          <a:prstGeom prst="rect">
+            <a:avLst/>
+          </a:prstGeom>
+        </p:spPr>
+      </p:pic>
+    </p:spTree>
+    <p:extLst>
+      <p:ext uri="{BB962C8B-B14F-4D97-AF65-F5344CB8AC3E}">
+        <p14:creationId xmlns:p14="http://schemas.microsoft.com/office/powerpoint/2010/main" val="856422870"/>
+      </p:ext>
+    </p:extLst>
+  </p:cSld>
+  <p:clrMapOvr>
+    <a:masterClrMapping/>
+  </p:clrMapOvr>
+</p:sld>
+</file>
+
+<file path=ppt/slides/slide21.xml><?xml version="1.0" encoding="utf-8"?>
+<p:sld xmlns:a="http://schemas.openxmlformats.org/drawingml/2006/main" xmlns:r="http://schemas.openxmlformats.org/officeDocument/2006/relationships" xmlns:p="http://schemas.openxmlformats.org/presentationml/2006/main">
+  <p:cSld>
+    <p:bg>
+      <p:bgPr>
+        <a:solidFill>
+          <a:schemeClr val="bg1"/>
+        </a:solidFill>
+        <a:effectLst/>
+      </p:bgPr>
+    </p:bg>
+    <p:spTree>
+      <p:nvGrpSpPr>
+        <p:cNvPr id="1" name=""/>
+        <p:cNvGrpSpPr/>
+        <p:nvPr/>
+      </p:nvGrpSpPr>
+      <p:grpSpPr>
+        <a:xfrm>
+          <a:off x="0" y="0"/>
+          <a:ext cx="0" cy="0"/>
+          <a:chOff x="0" y="0"/>
+          <a:chExt cx="0" cy="0"/>
+        </a:xfrm>
+      </p:grpSpPr>
+      <p:sp>
+        <p:nvSpPr>
+          <p:cNvPr id="8" name="Rectangle 7">
+            <a:extLst>
+              <a:ext uri="{FF2B5EF4-FFF2-40B4-BE49-F238E27FC236}">
+                <a16:creationId xmlns:a16="http://schemas.microsoft.com/office/drawing/2014/main" id="{DE7FFD28-545C-4C88-A2E7-152FB234C92C}"/>
+              </a:ext>
+              <a:ext uri="{C183D7F6-B498-43B3-948B-1728B52AA6E4}">
+                <adec:decorative xmlns:adec="http://schemas.microsoft.com/office/drawing/2017/decorative" val="1"/>
+              </a:ext>
+            </a:extLst>
+          </p:cNvPr>
+          <p:cNvSpPr>
+            <a:spLocks noGrp="1" noRot="1" noChangeAspect="1" noMove="1" noResize="1" noEditPoints="1" noAdjustHandles="1" noChangeArrowheads="1" noChangeShapeType="1" noTextEdit="1"/>
+          </p:cNvSpPr>
+          <p:nvPr>
+            <p:extLst>
+              <p:ext uri="{386F3935-93C4-4BCD-93E2-E3B085C9AB24}">
+                <p16:designElem xmlns:p16="http://schemas.microsoft.com/office/powerpoint/2015/main" val="1"/>
+              </p:ext>
+            </p:extLst>
+          </p:nvPr>
+        </p:nvSpPr>
+        <p:spPr>
+          <a:xfrm>
+            <a:off x="0" y="0"/>
+            <a:ext cx="12192000" cy="1911350"/>
+          </a:xfrm>
+          <a:prstGeom prst="rect">
+            <a:avLst/>
+          </a:prstGeom>
+          <a:solidFill>
+            <a:schemeClr val="accent5"/>
+          </a:solidFill>
+          <a:ln>
+            <a:noFill/>
+          </a:ln>
+        </p:spPr>
+        <p:style>
+          <a:lnRef idx="2">
+            <a:schemeClr val="accent1">
+              <a:shade val="50000"/>
+            </a:schemeClr>
+          </a:lnRef>
+          <a:fillRef idx="1">
+            <a:schemeClr val="accent1"/>
+          </a:fillRef>
+          <a:effectRef idx="0">
+            <a:schemeClr val="accent1"/>
+          </a:effectRef>
+          <a:fontRef idx="minor">
+            <a:schemeClr val="lt1"/>
+          </a:fontRef>
+        </p:style>
+        <p:txBody>
+          <a:bodyPr rtlCol="0" anchor="ctr"/>
+          <a:lstStyle/>
+          <a:p>
+            <a:pPr algn="ctr"/>
+            <a:endParaRPr lang="en-US"/>
+          </a:p>
+        </p:txBody>
+      </p:sp>
+      <p:sp>
+        <p:nvSpPr>
+          <p:cNvPr id="2" name="Titel 1">
+            <a:extLst>
+              <a:ext uri="{FF2B5EF4-FFF2-40B4-BE49-F238E27FC236}">
                 <a16:creationId xmlns:a16="http://schemas.microsoft.com/office/drawing/2014/main" id="{726DB519-7C19-20AB-D1CC-CC392EDDD857}"/>
               </a:ext>
             </a:extLst>
@@ -10858,7 +11106,7 @@
 </p:sld>
 </file>
 
-<file path=ppt/slides/slide21.xml><?xml version="1.0" encoding="utf-8"?>
+<file path=ppt/slides/slide22.xml><?xml version="1.0" encoding="utf-8"?>
 <p:sld xmlns:a="http://schemas.openxmlformats.org/drawingml/2006/main" xmlns:r="http://schemas.openxmlformats.org/officeDocument/2006/relationships" xmlns:p="http://schemas.openxmlformats.org/presentationml/2006/main">
   <p:cSld>
     <p:bg>

</xml_diff>